<commit_message>
ERD zur Statuspräsentation hinzugefügt
</commit_message>
<xml_diff>
--- a/Präsentation/Statuspräsentation1.pptx
+++ b/Präsentation/Statuspräsentation1.pptx
@@ -611,7 +611,7 @@
           <a:p>
             <a:fld id="{D1AEE69C-A511-489D-9735-98F84310A8BC}" type="datetimeFigureOut">
               <a:rPr lang="de-DE" smtClean="0"/>
-              <a:t>08.03.2019</a:t>
+              <a:t>09.03.2019</a:t>
             </a:fld>
             <a:endParaRPr lang="de-DE"/>
           </a:p>
@@ -9283,6 +9283,36 @@
           </a:p>
         </p:txBody>
       </p:sp>
+      <p:pic>
+        <p:nvPicPr>
+          <p:cNvPr id="8" name="Grafik 7">
+            <a:extLst>
+              <a:ext uri="{FF2B5EF4-FFF2-40B4-BE49-F238E27FC236}">
+                <a16:creationId xmlns:a16="http://schemas.microsoft.com/office/drawing/2014/main" id="{7BF818BB-F74D-4A95-8DEF-EBB1B1B2133A}"/>
+              </a:ext>
+            </a:extLst>
+          </p:cNvPr>
+          <p:cNvPicPr>
+            <a:picLocks noChangeAspect="1"/>
+          </p:cNvPicPr>
+          <p:nvPr/>
+        </p:nvPicPr>
+        <p:blipFill>
+          <a:blip r:embed="rId4"/>
+          <a:stretch>
+            <a:fillRect/>
+          </a:stretch>
+        </p:blipFill>
+        <p:spPr>
+          <a:xfrm>
+            <a:off x="684211" y="444307"/>
+            <a:ext cx="8801319" cy="3864206"/>
+          </a:xfrm>
+          <a:prstGeom prst="rect">
+            <a:avLst/>
+          </a:prstGeom>
+        </p:spPr>
+      </p:pic>
     </p:spTree>
     <p:extLst>
       <p:ext uri="{BB962C8B-B14F-4D97-AF65-F5344CB8AC3E}">

</xml_diff>

<commit_message>
UX-Teil (MockUps) der 1. Statuspräsentation hinzugefügt
</commit_message>
<xml_diff>
--- a/Präsentation/Statuspräsentation1.pptx
+++ b/Präsentation/Statuspräsentation1.pptx
@@ -5,16 +5,20 @@
     <p:sldMasterId id="2147483648" r:id="rId1"/>
   </p:sldMasterIdLst>
   <p:notesMasterIdLst>
-    <p:notesMasterId r:id="rId9"/>
+    <p:notesMasterId r:id="rId13"/>
   </p:notesMasterIdLst>
   <p:sldIdLst>
     <p:sldId id="256" r:id="rId2"/>
     <p:sldId id="257" r:id="rId3"/>
     <p:sldId id="260" r:id="rId4"/>
-    <p:sldId id="258" r:id="rId5"/>
-    <p:sldId id="261" r:id="rId6"/>
-    <p:sldId id="259" r:id="rId7"/>
-    <p:sldId id="265" r:id="rId8"/>
+    <p:sldId id="261" r:id="rId5"/>
+    <p:sldId id="258" r:id="rId6"/>
+    <p:sldId id="268" r:id="rId7"/>
+    <p:sldId id="269" r:id="rId8"/>
+    <p:sldId id="270" r:id="rId9"/>
+    <p:sldId id="271" r:id="rId10"/>
+    <p:sldId id="259" r:id="rId11"/>
+    <p:sldId id="265" r:id="rId12"/>
   </p:sldIdLst>
   <p:sldSz cx="12192000" cy="6858000"/>
   <p:notesSz cx="6858000" cy="9144000"/>
@@ -611,7 +615,7 @@
           <a:p>
             <a:fld id="{D1AEE69C-A511-489D-9735-98F84310A8BC}" type="datetimeFigureOut">
               <a:rPr lang="de-DE" smtClean="0"/>
-              <a:t>09.03.2019</a:t>
+              <a:t>10.03.2019</a:t>
             </a:fld>
             <a:endParaRPr lang="de-DE"/>
           </a:p>
@@ -6527,6 +6531,715 @@
 </p:sld>
 </file>
 
+<file path=ppt/slides/slide10.xml><?xml version="1.0" encoding="utf-8"?>
+<p:sld xmlns:a="http://schemas.openxmlformats.org/drawingml/2006/main" xmlns:r="http://schemas.openxmlformats.org/officeDocument/2006/relationships" xmlns:p="http://schemas.openxmlformats.org/presentationml/2006/main">
+  <p:cSld>
+    <p:spTree>
+      <p:nvGrpSpPr>
+        <p:cNvPr id="1" name=""/>
+        <p:cNvGrpSpPr/>
+        <p:nvPr/>
+      </p:nvGrpSpPr>
+      <p:grpSpPr>
+        <a:xfrm>
+          <a:off x="0" y="0"/>
+          <a:ext cx="0" cy="0"/>
+          <a:chOff x="0" y="0"/>
+          <a:chExt cx="0" cy="0"/>
+        </a:xfrm>
+      </p:grpSpPr>
+      <p:sp>
+        <p:nvSpPr>
+          <p:cNvPr id="4" name="Titel 3">
+            <a:extLst>
+              <a:ext uri="{FF2B5EF4-FFF2-40B4-BE49-F238E27FC236}">
+                <a16:creationId xmlns:a16="http://schemas.microsoft.com/office/drawing/2014/main" id="{84C68109-468E-4320-A347-CD61565ABD8B}"/>
+              </a:ext>
+            </a:extLst>
+          </p:cNvPr>
+          <p:cNvSpPr>
+            <a:spLocks noGrp="1"/>
+          </p:cNvSpPr>
+          <p:nvPr>
+            <p:ph type="title"/>
+          </p:nvPr>
+        </p:nvSpPr>
+        <p:spPr/>
+        <p:txBody>
+          <a:bodyPr/>
+          <a:lstStyle/>
+          <a:p>
+            <a:r>
+              <a:rPr lang="de-DE" dirty="0"/>
+              <a:t>IT-Architektur</a:t>
+            </a:r>
+          </a:p>
+        </p:txBody>
+      </p:sp>
+      <p:sp>
+        <p:nvSpPr>
+          <p:cNvPr id="5" name="Textplatzhalter 4">
+            <a:extLst>
+              <a:ext uri="{FF2B5EF4-FFF2-40B4-BE49-F238E27FC236}">
+                <a16:creationId xmlns:a16="http://schemas.microsoft.com/office/drawing/2014/main" id="{E127A5F6-278C-46F5-B682-739817FF04BE}"/>
+              </a:ext>
+            </a:extLst>
+          </p:cNvPr>
+          <p:cNvSpPr>
+            <a:spLocks noGrp="1"/>
+          </p:cNvSpPr>
+          <p:nvPr>
+            <p:ph type="body" idx="1"/>
+          </p:nvPr>
+        </p:nvSpPr>
+        <p:spPr/>
+        <p:txBody>
+          <a:bodyPr/>
+          <a:lstStyle/>
+          <a:p>
+            <a:r>
+              <a:rPr lang="de-DE" b="1" dirty="0"/>
+              <a:t>Domenik Kunzmann / IT-Architekt</a:t>
+            </a:r>
+          </a:p>
+        </p:txBody>
+      </p:sp>
+      <p:sp>
+        <p:nvSpPr>
+          <p:cNvPr id="2" name="Fußzeilenplatzhalter 1">
+            <a:extLst>
+              <a:ext uri="{FF2B5EF4-FFF2-40B4-BE49-F238E27FC236}">
+                <a16:creationId xmlns:a16="http://schemas.microsoft.com/office/drawing/2014/main" id="{FEE19599-E843-4699-BB14-BFFA47EE594B}"/>
+              </a:ext>
+            </a:extLst>
+          </p:cNvPr>
+          <p:cNvSpPr>
+            <a:spLocks noGrp="1"/>
+          </p:cNvSpPr>
+          <p:nvPr>
+            <p:ph type="ftr" sz="quarter" idx="11"/>
+          </p:nvPr>
+        </p:nvSpPr>
+        <p:spPr/>
+        <p:txBody>
+          <a:bodyPr/>
+          <a:lstStyle/>
+          <a:p>
+            <a:r>
+              <a:rPr lang="en-US"/>
+              <a:t>KA-Share</a:t>
+            </a:r>
+            <a:endParaRPr lang="en-US" dirty="0"/>
+          </a:p>
+        </p:txBody>
+      </p:sp>
+      <p:sp>
+        <p:nvSpPr>
+          <p:cNvPr id="3" name="Datumsplatzhalter 2">
+            <a:extLst>
+              <a:ext uri="{FF2B5EF4-FFF2-40B4-BE49-F238E27FC236}">
+                <a16:creationId xmlns:a16="http://schemas.microsoft.com/office/drawing/2014/main" id="{4C0874B5-6CE0-4569-96F9-A299B8752E77}"/>
+              </a:ext>
+            </a:extLst>
+          </p:cNvPr>
+          <p:cNvSpPr>
+            <a:spLocks noGrp="1"/>
+          </p:cNvSpPr>
+          <p:nvPr>
+            <p:ph type="dt" sz="half" idx="10"/>
+          </p:nvPr>
+        </p:nvSpPr>
+        <p:spPr/>
+        <p:txBody>
+          <a:bodyPr/>
+          <a:lstStyle/>
+          <a:p>
+            <a:r>
+              <a:rPr lang="de-DE"/>
+              <a:t>11.02.2019</a:t>
+            </a:r>
+            <a:endParaRPr lang="en-US" dirty="0"/>
+          </a:p>
+        </p:txBody>
+      </p:sp>
+      <p:pic>
+        <p:nvPicPr>
+          <p:cNvPr id="6" name="Grafik 5" descr="Auto">
+            <a:extLst>
+              <a:ext uri="{FF2B5EF4-FFF2-40B4-BE49-F238E27FC236}">
+                <a16:creationId xmlns:a16="http://schemas.microsoft.com/office/drawing/2014/main" id="{60F30CBD-42F4-4C44-974C-BC1991F6839A}"/>
+              </a:ext>
+            </a:extLst>
+          </p:cNvPr>
+          <p:cNvPicPr>
+            <a:picLocks noChangeAspect="1"/>
+          </p:cNvPicPr>
+          <p:nvPr/>
+        </p:nvPicPr>
+        <p:blipFill>
+          <a:blip r:embed="rId2">
+            <a:extLst>
+              <a:ext uri="{96DAC541-7B7A-43D3-8B79-37D633B846F1}">
+                <asvg:svgBlip xmlns:asvg="http://schemas.microsoft.com/office/drawing/2016/SVG/main" r:embed="rId3"/>
+              </a:ext>
+            </a:extLst>
+          </a:blip>
+          <a:stretch>
+            <a:fillRect/>
+          </a:stretch>
+        </p:blipFill>
+        <p:spPr>
+          <a:xfrm rot="18952507">
+            <a:off x="10890173" y="2415118"/>
+            <a:ext cx="1228875" cy="1228875"/>
+          </a:xfrm>
+          <a:prstGeom prst="rect">
+            <a:avLst/>
+          </a:prstGeom>
+        </p:spPr>
+      </p:pic>
+      <p:sp>
+        <p:nvSpPr>
+          <p:cNvPr id="7" name="Foliennummernplatzhalter 6">
+            <a:extLst>
+              <a:ext uri="{FF2B5EF4-FFF2-40B4-BE49-F238E27FC236}">
+                <a16:creationId xmlns:a16="http://schemas.microsoft.com/office/drawing/2014/main" id="{53C64041-F474-4836-AAA7-EDDA382CA278}"/>
+              </a:ext>
+            </a:extLst>
+          </p:cNvPr>
+          <p:cNvSpPr>
+            <a:spLocks noGrp="1"/>
+          </p:cNvSpPr>
+          <p:nvPr>
+            <p:ph type="sldNum" sz="quarter" idx="12"/>
+          </p:nvPr>
+        </p:nvSpPr>
+        <p:spPr/>
+        <p:txBody>
+          <a:bodyPr/>
+          <a:lstStyle/>
+          <a:p>
+            <a:fld id="{D57F1E4F-1CFF-5643-939E-217C01CDF565}" type="slidenum">
+              <a:rPr lang="en-US" smtClean="0"/>
+              <a:pPr/>
+              <a:t>10</a:t>
+            </a:fld>
+            <a:endParaRPr lang="en-US" dirty="0"/>
+          </a:p>
+        </p:txBody>
+      </p:sp>
+    </p:spTree>
+    <p:extLst>
+      <p:ext uri="{BB962C8B-B14F-4D97-AF65-F5344CB8AC3E}">
+        <p14:creationId xmlns:p14="http://schemas.microsoft.com/office/powerpoint/2010/main" val="2766168185"/>
+      </p:ext>
+    </p:extLst>
+  </p:cSld>
+  <p:clrMapOvr>
+    <a:masterClrMapping/>
+  </p:clrMapOvr>
+</p:sld>
+</file>
+
+<file path=ppt/slides/slide11.xml><?xml version="1.0" encoding="utf-8"?>
+<p:sld xmlns:a="http://schemas.openxmlformats.org/drawingml/2006/main" xmlns:r="http://schemas.openxmlformats.org/officeDocument/2006/relationships" xmlns:p="http://schemas.openxmlformats.org/presentationml/2006/main">
+  <p:cSld>
+    <p:spTree>
+      <p:nvGrpSpPr>
+        <p:cNvPr id="1" name=""/>
+        <p:cNvGrpSpPr/>
+        <p:nvPr/>
+      </p:nvGrpSpPr>
+      <p:grpSpPr>
+        <a:xfrm>
+          <a:off x="0" y="0"/>
+          <a:ext cx="0" cy="0"/>
+          <a:chOff x="0" y="0"/>
+          <a:chExt cx="0" cy="0"/>
+        </a:xfrm>
+      </p:grpSpPr>
+      <p:sp>
+        <p:nvSpPr>
+          <p:cNvPr id="4" name="Titel 3">
+            <a:extLst>
+              <a:ext uri="{FF2B5EF4-FFF2-40B4-BE49-F238E27FC236}">
+                <a16:creationId xmlns:a16="http://schemas.microsoft.com/office/drawing/2014/main" id="{84C68109-468E-4320-A347-CD61565ABD8B}"/>
+              </a:ext>
+            </a:extLst>
+          </p:cNvPr>
+          <p:cNvSpPr>
+            <a:spLocks noGrp="1"/>
+          </p:cNvSpPr>
+          <p:nvPr>
+            <p:ph type="title"/>
+          </p:nvPr>
+        </p:nvSpPr>
+        <p:spPr>
+          <a:xfrm>
+            <a:off x="684212" y="4487333"/>
+            <a:ext cx="8534400" cy="1058268"/>
+          </a:xfrm>
+        </p:spPr>
+        <p:txBody>
+          <a:bodyPr/>
+          <a:lstStyle/>
+          <a:p>
+            <a:r>
+              <a:rPr lang="de-DE" dirty="0"/>
+              <a:t>Datenbank</a:t>
+            </a:r>
+          </a:p>
+        </p:txBody>
+      </p:sp>
+      <p:sp>
+        <p:nvSpPr>
+          <p:cNvPr id="2" name="Datumsplatzhalter 1">
+            <a:extLst>
+              <a:ext uri="{FF2B5EF4-FFF2-40B4-BE49-F238E27FC236}">
+                <a16:creationId xmlns:a16="http://schemas.microsoft.com/office/drawing/2014/main" id="{B7F37089-E0D7-4721-9818-6F58D6F24ED4}"/>
+              </a:ext>
+            </a:extLst>
+          </p:cNvPr>
+          <p:cNvSpPr>
+            <a:spLocks noGrp="1"/>
+          </p:cNvSpPr>
+          <p:nvPr>
+            <p:ph type="dt" sz="half" idx="10"/>
+          </p:nvPr>
+        </p:nvSpPr>
+        <p:spPr/>
+        <p:txBody>
+          <a:bodyPr/>
+          <a:lstStyle/>
+          <a:p>
+            <a:r>
+              <a:rPr lang="de-DE"/>
+              <a:t>11.02.2019</a:t>
+            </a:r>
+            <a:endParaRPr lang="en-US" dirty="0"/>
+          </a:p>
+        </p:txBody>
+      </p:sp>
+      <p:sp>
+        <p:nvSpPr>
+          <p:cNvPr id="6" name="Fußzeilenplatzhalter 5">
+            <a:extLst>
+              <a:ext uri="{FF2B5EF4-FFF2-40B4-BE49-F238E27FC236}">
+                <a16:creationId xmlns:a16="http://schemas.microsoft.com/office/drawing/2014/main" id="{EEC4A702-6041-4042-9E95-76C25F4F7EE1}"/>
+              </a:ext>
+            </a:extLst>
+          </p:cNvPr>
+          <p:cNvSpPr>
+            <a:spLocks noGrp="1"/>
+          </p:cNvSpPr>
+          <p:nvPr>
+            <p:ph type="ftr" sz="quarter" idx="11"/>
+          </p:nvPr>
+        </p:nvSpPr>
+        <p:spPr/>
+        <p:txBody>
+          <a:bodyPr/>
+          <a:lstStyle/>
+          <a:p>
+            <a:r>
+              <a:rPr lang="en-US">
+                <a:solidFill>
+                  <a:schemeClr val="tx2">
+                    <a:lumMod val="20000"/>
+                    <a:lumOff val="80000"/>
+                  </a:schemeClr>
+                </a:solidFill>
+              </a:rPr>
+              <a:t>KA-Share</a:t>
+            </a:r>
+            <a:endParaRPr lang="en-US" dirty="0">
+              <a:solidFill>
+                <a:schemeClr val="tx2">
+                  <a:lumMod val="20000"/>
+                  <a:lumOff val="80000"/>
+                </a:schemeClr>
+              </a:solidFill>
+            </a:endParaRPr>
+          </a:p>
+        </p:txBody>
+      </p:sp>
+      <p:sp>
+        <p:nvSpPr>
+          <p:cNvPr id="3" name="Foliennummernplatzhalter 2">
+            <a:extLst>
+              <a:ext uri="{FF2B5EF4-FFF2-40B4-BE49-F238E27FC236}">
+                <a16:creationId xmlns:a16="http://schemas.microsoft.com/office/drawing/2014/main" id="{D0BBF157-124A-4B08-AF72-A5EF9841D304}"/>
+              </a:ext>
+            </a:extLst>
+          </p:cNvPr>
+          <p:cNvSpPr>
+            <a:spLocks noGrp="1"/>
+          </p:cNvSpPr>
+          <p:nvPr>
+            <p:ph type="sldNum" sz="quarter" idx="12"/>
+          </p:nvPr>
+        </p:nvSpPr>
+        <p:spPr/>
+        <p:txBody>
+          <a:bodyPr/>
+          <a:lstStyle/>
+          <a:p>
+            <a:fld id="{D57F1E4F-1CFF-5643-939E-217C01CDF565}" type="slidenum">
+              <a:rPr lang="en-US" smtClean="0"/>
+              <a:pPr/>
+              <a:t>11</a:t>
+            </a:fld>
+            <a:endParaRPr lang="en-US" dirty="0"/>
+          </a:p>
+        </p:txBody>
+      </p:sp>
+      <p:pic>
+        <p:nvPicPr>
+          <p:cNvPr id="7" name="Grafik 6" descr="Auto">
+            <a:extLst>
+              <a:ext uri="{FF2B5EF4-FFF2-40B4-BE49-F238E27FC236}">
+                <a16:creationId xmlns:a16="http://schemas.microsoft.com/office/drawing/2014/main" id="{E22131F2-98A3-4859-A680-0372D9EDC374}"/>
+              </a:ext>
+            </a:extLst>
+          </p:cNvPr>
+          <p:cNvPicPr>
+            <a:picLocks noChangeAspect="1"/>
+          </p:cNvPicPr>
+          <p:nvPr/>
+        </p:nvPicPr>
+        <p:blipFill>
+          <a:blip r:embed="rId2">
+            <a:extLst>
+              <a:ext uri="{96DAC541-7B7A-43D3-8B79-37D633B846F1}">
+                <asvg:svgBlip xmlns:asvg="http://schemas.microsoft.com/office/drawing/2016/SVG/main" r:embed="rId3"/>
+              </a:ext>
+            </a:extLst>
+          </a:blip>
+          <a:stretch>
+            <a:fillRect/>
+          </a:stretch>
+        </p:blipFill>
+        <p:spPr>
+          <a:xfrm rot="18952507">
+            <a:off x="10890173" y="2415118"/>
+            <a:ext cx="1228875" cy="1228875"/>
+          </a:xfrm>
+          <a:prstGeom prst="rect">
+            <a:avLst/>
+          </a:prstGeom>
+        </p:spPr>
+      </p:pic>
+      <p:sp>
+        <p:nvSpPr>
+          <p:cNvPr id="18" name="Textplatzhalter 4">
+            <a:extLst>
+              <a:ext uri="{FF2B5EF4-FFF2-40B4-BE49-F238E27FC236}">
+                <a16:creationId xmlns:a16="http://schemas.microsoft.com/office/drawing/2014/main" id="{79A759CD-A5B6-45B0-93FC-60D96E4FBB0A}"/>
+              </a:ext>
+            </a:extLst>
+          </p:cNvPr>
+          <p:cNvSpPr txBox="1">
+            <a:spLocks/>
+          </p:cNvSpPr>
+          <p:nvPr/>
+        </p:nvSpPr>
+        <p:spPr>
+          <a:xfrm>
+            <a:off x="684211" y="5251507"/>
+            <a:ext cx="8535990" cy="741873"/>
+          </a:xfrm>
+          <a:prstGeom prst="rect">
+            <a:avLst/>
+          </a:prstGeom>
+        </p:spPr>
+        <p:txBody>
+          <a:bodyPr vert="horz" lIns="91440" tIns="45720" rIns="91440" bIns="45720" rtlCol="0" anchor="ctr">
+            <a:normAutofit/>
+          </a:bodyPr>
+          <a:lstStyle>
+            <a:lvl1pPr marL="285750" indent="-285750" algn="l" defTabSz="457200" rtl="0" eaLnBrk="1" latinLnBrk="0" hangingPunct="1">
+              <a:spcBef>
+                <a:spcPct val="20000"/>
+              </a:spcBef>
+              <a:spcAft>
+                <a:spcPts val="600"/>
+              </a:spcAft>
+              <a:buClr>
+                <a:schemeClr val="tx1"/>
+              </a:buClr>
+              <a:buSzPct val="80000"/>
+              <a:buFont typeface="Wingdings 3" panose="05040102010807070707" pitchFamily="18" charset="2"/>
+              <a:buChar char=""/>
+              <a:defRPr sz="2000" kern="1200" cap="none">
+                <a:solidFill>
+                  <a:schemeClr val="bg2">
+                    <a:lumMod val="75000"/>
+                  </a:schemeClr>
+                </a:solidFill>
+                <a:effectLst/>
+                <a:latin typeface="+mn-lt"/>
+                <a:ea typeface="+mn-ea"/>
+                <a:cs typeface="+mn-cs"/>
+              </a:defRPr>
+            </a:lvl1pPr>
+            <a:lvl2pPr marL="742950" indent="-285750" algn="l" defTabSz="457200" rtl="0" eaLnBrk="1" latinLnBrk="0" hangingPunct="1">
+              <a:spcBef>
+                <a:spcPct val="20000"/>
+              </a:spcBef>
+              <a:spcAft>
+                <a:spcPts val="600"/>
+              </a:spcAft>
+              <a:buClr>
+                <a:schemeClr val="tx1"/>
+              </a:buClr>
+              <a:buSzPct val="80000"/>
+              <a:buFont typeface="Wingdings 3" panose="05040102010807070707" pitchFamily="18" charset="2"/>
+              <a:buChar char=""/>
+              <a:defRPr sz="1800" kern="1200" cap="none">
+                <a:solidFill>
+                  <a:schemeClr val="bg2">
+                    <a:lumMod val="75000"/>
+                  </a:schemeClr>
+                </a:solidFill>
+                <a:effectLst/>
+                <a:latin typeface="+mn-lt"/>
+                <a:ea typeface="+mn-ea"/>
+                <a:cs typeface="+mn-cs"/>
+              </a:defRPr>
+            </a:lvl2pPr>
+            <a:lvl3pPr marL="1200150" indent="-285750" algn="l" defTabSz="457200" rtl="0" eaLnBrk="1" latinLnBrk="0" hangingPunct="1">
+              <a:spcBef>
+                <a:spcPct val="20000"/>
+              </a:spcBef>
+              <a:spcAft>
+                <a:spcPts val="600"/>
+              </a:spcAft>
+              <a:buClr>
+                <a:schemeClr val="tx1"/>
+              </a:buClr>
+              <a:buSzPct val="80000"/>
+              <a:buFont typeface="Wingdings 3" panose="05040102010807070707" pitchFamily="18" charset="2"/>
+              <a:buChar char=""/>
+              <a:defRPr sz="1600" kern="1200" cap="none">
+                <a:solidFill>
+                  <a:schemeClr val="bg2">
+                    <a:lumMod val="75000"/>
+                  </a:schemeClr>
+                </a:solidFill>
+                <a:effectLst/>
+                <a:latin typeface="+mn-lt"/>
+                <a:ea typeface="+mn-ea"/>
+                <a:cs typeface="+mn-cs"/>
+              </a:defRPr>
+            </a:lvl3pPr>
+            <a:lvl4pPr marL="1543050" indent="-171450" algn="l" defTabSz="457200" rtl="0" eaLnBrk="1" latinLnBrk="0" hangingPunct="1">
+              <a:spcBef>
+                <a:spcPct val="20000"/>
+              </a:spcBef>
+              <a:spcAft>
+                <a:spcPts val="600"/>
+              </a:spcAft>
+              <a:buClr>
+                <a:schemeClr val="tx1"/>
+              </a:buClr>
+              <a:buSzPct val="80000"/>
+              <a:buFont typeface="Wingdings 3" panose="05040102010807070707" pitchFamily="18" charset="2"/>
+              <a:buChar char=""/>
+              <a:defRPr sz="1400" kern="1200" cap="none">
+                <a:solidFill>
+                  <a:schemeClr val="bg2">
+                    <a:lumMod val="75000"/>
+                  </a:schemeClr>
+                </a:solidFill>
+                <a:effectLst/>
+                <a:latin typeface="+mn-lt"/>
+                <a:ea typeface="+mn-ea"/>
+                <a:cs typeface="+mn-cs"/>
+              </a:defRPr>
+            </a:lvl4pPr>
+            <a:lvl5pPr marL="2000250" indent="-171450" algn="l" defTabSz="457200" rtl="0" eaLnBrk="1" latinLnBrk="0" hangingPunct="1">
+              <a:spcBef>
+                <a:spcPct val="20000"/>
+              </a:spcBef>
+              <a:spcAft>
+                <a:spcPts val="600"/>
+              </a:spcAft>
+              <a:buClr>
+                <a:schemeClr val="tx1"/>
+              </a:buClr>
+              <a:buSzPct val="80000"/>
+              <a:buFont typeface="Wingdings 3" panose="05040102010807070707" pitchFamily="18" charset="2"/>
+              <a:buChar char=""/>
+              <a:defRPr sz="1400" kern="1200" cap="none">
+                <a:solidFill>
+                  <a:schemeClr val="bg2">
+                    <a:lumMod val="75000"/>
+                  </a:schemeClr>
+                </a:solidFill>
+                <a:effectLst/>
+                <a:latin typeface="+mn-lt"/>
+                <a:ea typeface="+mn-ea"/>
+                <a:cs typeface="+mn-cs"/>
+              </a:defRPr>
+            </a:lvl5pPr>
+            <a:lvl6pPr marL="2514600" indent="-228600" algn="l" defTabSz="457200" rtl="0" eaLnBrk="1" latinLnBrk="0" hangingPunct="1">
+              <a:spcBef>
+                <a:spcPct val="20000"/>
+              </a:spcBef>
+              <a:spcAft>
+                <a:spcPts val="600"/>
+              </a:spcAft>
+              <a:buClr>
+                <a:schemeClr val="tx1"/>
+              </a:buClr>
+              <a:buSzPct val="80000"/>
+              <a:buFont typeface="Wingdings 3" panose="05040102010807070707" pitchFamily="18" charset="2"/>
+              <a:buChar char=""/>
+              <a:defRPr sz="1400" kern="1200" cap="none">
+                <a:solidFill>
+                  <a:schemeClr val="bg2">
+                    <a:lumMod val="75000"/>
+                  </a:schemeClr>
+                </a:solidFill>
+                <a:effectLst/>
+                <a:latin typeface="+mn-lt"/>
+                <a:ea typeface="+mn-ea"/>
+                <a:cs typeface="+mn-cs"/>
+              </a:defRPr>
+            </a:lvl6pPr>
+            <a:lvl7pPr marL="2971800" indent="-228600" algn="l" defTabSz="457200" rtl="0" eaLnBrk="1" latinLnBrk="0" hangingPunct="1">
+              <a:spcBef>
+                <a:spcPct val="20000"/>
+              </a:spcBef>
+              <a:spcAft>
+                <a:spcPts val="600"/>
+              </a:spcAft>
+              <a:buClr>
+                <a:schemeClr val="tx1"/>
+              </a:buClr>
+              <a:buSzPct val="80000"/>
+              <a:buFont typeface="Wingdings 3" panose="05040102010807070707" pitchFamily="18" charset="2"/>
+              <a:buChar char=""/>
+              <a:defRPr sz="1400" kern="1200" cap="none">
+                <a:solidFill>
+                  <a:schemeClr val="bg2">
+                    <a:lumMod val="75000"/>
+                  </a:schemeClr>
+                </a:solidFill>
+                <a:effectLst/>
+                <a:latin typeface="+mn-lt"/>
+                <a:ea typeface="+mn-ea"/>
+                <a:cs typeface="+mn-cs"/>
+              </a:defRPr>
+            </a:lvl7pPr>
+            <a:lvl8pPr marL="3429000" indent="-228600" algn="l" defTabSz="457200" rtl="0" eaLnBrk="1" latinLnBrk="0" hangingPunct="1">
+              <a:spcBef>
+                <a:spcPct val="20000"/>
+              </a:spcBef>
+              <a:spcAft>
+                <a:spcPts val="600"/>
+              </a:spcAft>
+              <a:buClr>
+                <a:schemeClr val="tx1"/>
+              </a:buClr>
+              <a:buSzPct val="80000"/>
+              <a:buFont typeface="Wingdings 3" panose="05040102010807070707" pitchFamily="18" charset="2"/>
+              <a:buChar char=""/>
+              <a:defRPr sz="1400" kern="1200" cap="none">
+                <a:solidFill>
+                  <a:schemeClr val="bg2">
+                    <a:lumMod val="75000"/>
+                  </a:schemeClr>
+                </a:solidFill>
+                <a:effectLst/>
+                <a:latin typeface="+mn-lt"/>
+                <a:ea typeface="+mn-ea"/>
+                <a:cs typeface="+mn-cs"/>
+              </a:defRPr>
+            </a:lvl8pPr>
+            <a:lvl9pPr marL="3886200" indent="-228600" algn="l" defTabSz="457200" rtl="0" eaLnBrk="1" latinLnBrk="0" hangingPunct="1">
+              <a:spcBef>
+                <a:spcPct val="20000"/>
+              </a:spcBef>
+              <a:spcAft>
+                <a:spcPts val="600"/>
+              </a:spcAft>
+              <a:buClr>
+                <a:schemeClr val="tx1"/>
+              </a:buClr>
+              <a:buSzPct val="80000"/>
+              <a:buFont typeface="Wingdings 3" panose="05040102010807070707" pitchFamily="18" charset="2"/>
+              <a:buChar char=""/>
+              <a:defRPr sz="1400" kern="1200" cap="none">
+                <a:solidFill>
+                  <a:schemeClr val="bg2">
+                    <a:lumMod val="75000"/>
+                  </a:schemeClr>
+                </a:solidFill>
+                <a:effectLst/>
+                <a:latin typeface="+mn-lt"/>
+                <a:ea typeface="+mn-ea"/>
+                <a:cs typeface="+mn-cs"/>
+              </a:defRPr>
+            </a:lvl9pPr>
+          </a:lstStyle>
+          <a:p>
+            <a:pPr marL="0" indent="0">
+              <a:buNone/>
+            </a:pPr>
+            <a:r>
+              <a:rPr lang="de-DE" b="1" dirty="0"/>
+              <a:t>Benjamin Kanzler / Datenbank-Administrator</a:t>
+            </a:r>
+          </a:p>
+          <a:p>
+            <a:endParaRPr lang="de-DE" dirty="0"/>
+          </a:p>
+        </p:txBody>
+      </p:sp>
+      <p:pic>
+        <p:nvPicPr>
+          <p:cNvPr id="8" name="Grafik 7">
+            <a:extLst>
+              <a:ext uri="{FF2B5EF4-FFF2-40B4-BE49-F238E27FC236}">
+                <a16:creationId xmlns:a16="http://schemas.microsoft.com/office/drawing/2014/main" id="{7BF818BB-F74D-4A95-8DEF-EBB1B1B2133A}"/>
+              </a:ext>
+            </a:extLst>
+          </p:cNvPr>
+          <p:cNvPicPr>
+            <a:picLocks noChangeAspect="1"/>
+          </p:cNvPicPr>
+          <p:nvPr/>
+        </p:nvPicPr>
+        <p:blipFill>
+          <a:blip r:embed="rId4"/>
+          <a:stretch>
+            <a:fillRect/>
+          </a:stretch>
+        </p:blipFill>
+        <p:spPr>
+          <a:xfrm>
+            <a:off x="684211" y="444307"/>
+            <a:ext cx="8801319" cy="3864206"/>
+          </a:xfrm>
+          <a:prstGeom prst="rect">
+            <a:avLst/>
+          </a:prstGeom>
+        </p:spPr>
+      </p:pic>
+    </p:spTree>
+    <p:extLst>
+      <p:ext uri="{BB962C8B-B14F-4D97-AF65-F5344CB8AC3E}">
+        <p14:creationId xmlns:p14="http://schemas.microsoft.com/office/powerpoint/2010/main" val="3846731267"/>
+      </p:ext>
+    </p:extLst>
+  </p:cSld>
+  <p:clrMapOvr>
+    <a:masterClrMapping/>
+  </p:clrMapOvr>
+</p:sld>
+</file>
+
 <file path=ppt/slides/slide2.xml><?xml version="1.0" encoding="utf-8"?>
 <p:sld xmlns:a="http://schemas.openxmlformats.org/drawingml/2006/main" xmlns:r="http://schemas.openxmlformats.org/officeDocument/2006/relationships" xmlns:p="http://schemas.openxmlformats.org/presentationml/2006/main">
   <p:cSld>
@@ -8189,13 +8902,24 @@
           <a:p>
             <a:r>
               <a:rPr lang="de-DE" dirty="0"/>
-              <a:t>Mock-</a:t>
+              <a:t>Use </a:t>
             </a:r>
             <a:r>
               <a:rPr lang="de-DE" dirty="0" err="1"/>
-              <a:t>ups</a:t>
-            </a:r>
-            <a:endParaRPr lang="de-DE" dirty="0"/>
+              <a:t>cases</a:t>
+            </a:r>
+            <a:r>
+              <a:rPr lang="de-DE" dirty="0"/>
+              <a:t> &amp; </a:t>
+            </a:r>
+            <a:r>
+              <a:rPr lang="de-DE" dirty="0" err="1"/>
+              <a:t>Product</a:t>
+            </a:r>
+            <a:r>
+              <a:rPr lang="de-DE" dirty="0"/>
+              <a:t> Backlog</a:t>
+            </a:r>
           </a:p>
         </p:txBody>
       </p:sp>
@@ -8221,16 +8945,244 @@
           <a:lstStyle/>
           <a:p>
             <a:r>
+              <a:rPr lang="de-DE" dirty="0"/>
+              <a:t>Orlando </a:t>
+            </a:r>
+            <a:r>
+              <a:rPr lang="de-DE" dirty="0" err="1"/>
+              <a:t>Jähde</a:t>
+            </a:r>
+            <a:r>
+              <a:rPr lang="de-DE" dirty="0"/>
+              <a:t> / </a:t>
+            </a:r>
+            <a:r>
+              <a:rPr lang="de-DE" dirty="0" err="1"/>
+              <a:t>Requirements</a:t>
+            </a:r>
+            <a:r>
+              <a:rPr lang="de-DE" dirty="0"/>
+              <a:t> Engineer. </a:t>
+            </a:r>
+          </a:p>
+        </p:txBody>
+      </p:sp>
+      <p:sp>
+        <p:nvSpPr>
+          <p:cNvPr id="2" name="Fußzeilenplatzhalter 1">
+            <a:extLst>
+              <a:ext uri="{FF2B5EF4-FFF2-40B4-BE49-F238E27FC236}">
+                <a16:creationId xmlns:a16="http://schemas.microsoft.com/office/drawing/2014/main" id="{306E8936-FEFA-4DDD-A3E6-EB4DE1F01174}"/>
+              </a:ext>
+            </a:extLst>
+          </p:cNvPr>
+          <p:cNvSpPr>
+            <a:spLocks noGrp="1"/>
+          </p:cNvSpPr>
+          <p:nvPr>
+            <p:ph type="ftr" sz="quarter" idx="11"/>
+          </p:nvPr>
+        </p:nvSpPr>
+        <p:spPr/>
+        <p:txBody>
+          <a:bodyPr/>
+          <a:lstStyle/>
+          <a:p>
+            <a:r>
+              <a:rPr lang="en-US"/>
+              <a:t>KA-Share</a:t>
+            </a:r>
+            <a:endParaRPr lang="en-US" dirty="0"/>
+          </a:p>
+        </p:txBody>
+      </p:sp>
+      <p:sp>
+        <p:nvSpPr>
+          <p:cNvPr id="3" name="Datumsplatzhalter 2">
+            <a:extLst>
+              <a:ext uri="{FF2B5EF4-FFF2-40B4-BE49-F238E27FC236}">
+                <a16:creationId xmlns:a16="http://schemas.microsoft.com/office/drawing/2014/main" id="{4C032F13-4FCD-45A5-B5A7-EA3E25D97440}"/>
+              </a:ext>
+            </a:extLst>
+          </p:cNvPr>
+          <p:cNvSpPr>
+            <a:spLocks noGrp="1"/>
+          </p:cNvSpPr>
+          <p:nvPr>
+            <p:ph type="dt" sz="half" idx="10"/>
+          </p:nvPr>
+        </p:nvSpPr>
+        <p:spPr/>
+        <p:txBody>
+          <a:bodyPr/>
+          <a:lstStyle/>
+          <a:p>
+            <a:r>
+              <a:rPr lang="de-DE"/>
+              <a:t>11.02.2019</a:t>
+            </a:r>
+            <a:endParaRPr lang="en-US" dirty="0"/>
+          </a:p>
+        </p:txBody>
+      </p:sp>
+      <p:pic>
+        <p:nvPicPr>
+          <p:cNvPr id="6" name="Grafik 5" descr="Auto">
+            <a:extLst>
+              <a:ext uri="{FF2B5EF4-FFF2-40B4-BE49-F238E27FC236}">
+                <a16:creationId xmlns:a16="http://schemas.microsoft.com/office/drawing/2014/main" id="{2AEF1B7A-EF9B-4553-BDEE-5CE100830634}"/>
+              </a:ext>
+            </a:extLst>
+          </p:cNvPr>
+          <p:cNvPicPr>
+            <a:picLocks noChangeAspect="1"/>
+          </p:cNvPicPr>
+          <p:nvPr/>
+        </p:nvPicPr>
+        <p:blipFill>
+          <a:blip r:embed="rId2">
+            <a:extLst>
+              <a:ext uri="{96DAC541-7B7A-43D3-8B79-37D633B846F1}">
+                <asvg:svgBlip xmlns:asvg="http://schemas.microsoft.com/office/drawing/2016/SVG/main" r:embed="rId3"/>
+              </a:ext>
+            </a:extLst>
+          </a:blip>
+          <a:stretch>
+            <a:fillRect/>
+          </a:stretch>
+        </p:blipFill>
+        <p:spPr>
+          <a:xfrm rot="18952507">
+            <a:off x="10890173" y="2415118"/>
+            <a:ext cx="1228875" cy="1228875"/>
+          </a:xfrm>
+          <a:prstGeom prst="rect">
+            <a:avLst/>
+          </a:prstGeom>
+        </p:spPr>
+      </p:pic>
+      <p:sp>
+        <p:nvSpPr>
+          <p:cNvPr id="7" name="Foliennummernplatzhalter 6">
+            <a:extLst>
+              <a:ext uri="{FF2B5EF4-FFF2-40B4-BE49-F238E27FC236}">
+                <a16:creationId xmlns:a16="http://schemas.microsoft.com/office/drawing/2014/main" id="{68C30B81-E412-473B-9A64-1F79562133A3}"/>
+              </a:ext>
+            </a:extLst>
+          </p:cNvPr>
+          <p:cNvSpPr>
+            <a:spLocks noGrp="1"/>
+          </p:cNvSpPr>
+          <p:nvPr>
+            <p:ph type="sldNum" sz="quarter" idx="12"/>
+          </p:nvPr>
+        </p:nvSpPr>
+        <p:spPr/>
+        <p:txBody>
+          <a:bodyPr/>
+          <a:lstStyle/>
+          <a:p>
+            <a:fld id="{D57F1E4F-1CFF-5643-939E-217C01CDF565}" type="slidenum">
+              <a:rPr lang="en-US" smtClean="0"/>
+              <a:pPr/>
+              <a:t>4</a:t>
+            </a:fld>
+            <a:endParaRPr lang="en-US" dirty="0"/>
+          </a:p>
+        </p:txBody>
+      </p:sp>
+    </p:spTree>
+    <p:extLst>
+      <p:ext uri="{BB962C8B-B14F-4D97-AF65-F5344CB8AC3E}">
+        <p14:creationId xmlns:p14="http://schemas.microsoft.com/office/powerpoint/2010/main" val="3105482310"/>
+      </p:ext>
+    </p:extLst>
+  </p:cSld>
+  <p:clrMapOvr>
+    <a:masterClrMapping/>
+  </p:clrMapOvr>
+</p:sld>
+</file>
+
+<file path=ppt/slides/slide5.xml><?xml version="1.0" encoding="utf-8"?>
+<p:sld xmlns:a="http://schemas.openxmlformats.org/drawingml/2006/main" xmlns:r="http://schemas.openxmlformats.org/officeDocument/2006/relationships" xmlns:p="http://schemas.openxmlformats.org/presentationml/2006/main">
+  <p:cSld>
+    <p:spTree>
+      <p:nvGrpSpPr>
+        <p:cNvPr id="1" name=""/>
+        <p:cNvGrpSpPr/>
+        <p:nvPr/>
+      </p:nvGrpSpPr>
+      <p:grpSpPr>
+        <a:xfrm>
+          <a:off x="0" y="0"/>
+          <a:ext cx="0" cy="0"/>
+          <a:chOff x="0" y="0"/>
+          <a:chExt cx="0" cy="0"/>
+        </a:xfrm>
+      </p:grpSpPr>
+      <p:sp>
+        <p:nvSpPr>
+          <p:cNvPr id="4" name="Titel 3">
+            <a:extLst>
+              <a:ext uri="{FF2B5EF4-FFF2-40B4-BE49-F238E27FC236}">
+                <a16:creationId xmlns:a16="http://schemas.microsoft.com/office/drawing/2014/main" id="{84C68109-468E-4320-A347-CD61565ABD8B}"/>
+              </a:ext>
+            </a:extLst>
+          </p:cNvPr>
+          <p:cNvSpPr>
+            <a:spLocks noGrp="1"/>
+          </p:cNvSpPr>
+          <p:nvPr>
+            <p:ph type="title"/>
+          </p:nvPr>
+        </p:nvSpPr>
+        <p:spPr>
+          <a:xfrm>
+            <a:off x="684212" y="4411744"/>
+            <a:ext cx="8534400" cy="714656"/>
+          </a:xfrm>
+        </p:spPr>
+        <p:txBody>
+          <a:bodyPr/>
+          <a:lstStyle/>
+          <a:p>
+            <a:r>
+              <a:rPr lang="de-DE" dirty="0"/>
+              <a:t>Mock-</a:t>
+            </a:r>
+            <a:r>
+              <a:rPr lang="de-DE" dirty="0" err="1"/>
+              <a:t>ups</a:t>
+            </a:r>
+            <a:endParaRPr lang="de-DE" dirty="0"/>
+          </a:p>
+        </p:txBody>
+      </p:sp>
+      <p:sp>
+        <p:nvSpPr>
+          <p:cNvPr id="5" name="Textplatzhalter 4">
+            <a:extLst>
+              <a:ext uri="{FF2B5EF4-FFF2-40B4-BE49-F238E27FC236}">
+                <a16:creationId xmlns:a16="http://schemas.microsoft.com/office/drawing/2014/main" id="{E127A5F6-278C-46F5-B682-739817FF04BE}"/>
+              </a:ext>
+            </a:extLst>
+          </p:cNvPr>
+          <p:cNvSpPr>
+            <a:spLocks noGrp="1"/>
+          </p:cNvSpPr>
+          <p:nvPr>
+            <p:ph type="body" idx="1"/>
+          </p:nvPr>
+        </p:nvSpPr>
+        <p:spPr/>
+        <p:txBody>
+          <a:bodyPr/>
+          <a:lstStyle/>
+          <a:p>
+            <a:r>
               <a:rPr lang="de-DE" b="1" dirty="0"/>
-              <a:t>Christopher </a:t>
-            </a:r>
-            <a:r>
-              <a:rPr lang="de-DE" b="1" dirty="0" err="1"/>
-              <a:t>Pschibila</a:t>
-            </a:r>
-            <a:r>
-              <a:rPr lang="de-DE" b="1" dirty="0"/>
-              <a:t> / Rolle</a:t>
+              <a:t>Christopher Pschibila / Programmierer / UX-Manager</a:t>
             </a:r>
           </a:p>
           <a:p>
@@ -8356,9 +9308,144 @@
             <a:fld id="{D57F1E4F-1CFF-5643-939E-217C01CDF565}" type="slidenum">
               <a:rPr lang="en-US" smtClean="0"/>
               <a:pPr/>
-              <a:t>4</a:t>
+              <a:t>5</a:t>
             </a:fld>
             <a:endParaRPr lang="en-US" dirty="0"/>
+          </a:p>
+        </p:txBody>
+      </p:sp>
+      <p:sp>
+        <p:nvSpPr>
+          <p:cNvPr id="8" name="Titel 3">
+            <a:extLst>
+              <a:ext uri="{FF2B5EF4-FFF2-40B4-BE49-F238E27FC236}">
+                <a16:creationId xmlns:a16="http://schemas.microsoft.com/office/drawing/2014/main" id="{CC9F845A-93E8-4B2B-ADEF-BED8801FF075}"/>
+              </a:ext>
+            </a:extLst>
+          </p:cNvPr>
+          <p:cNvSpPr txBox="1">
+            <a:spLocks/>
+          </p:cNvSpPr>
+          <p:nvPr/>
+        </p:nvSpPr>
+        <p:spPr>
+          <a:xfrm>
+            <a:off x="749614" y="1132787"/>
+            <a:ext cx="9212361" cy="2296214"/>
+          </a:xfrm>
+          <a:prstGeom prst="rect">
+            <a:avLst/>
+          </a:prstGeom>
+          <a:effectLst/>
+        </p:spPr>
+        <p:txBody>
+          <a:bodyPr vert="horz" lIns="91440" tIns="45720" rIns="91440" bIns="45720" rtlCol="0" anchor="b">
+            <a:normAutofit/>
+          </a:bodyPr>
+          <a:lstStyle>
+            <a:lvl1pPr algn="l" defTabSz="457200" rtl="0" eaLnBrk="1" latinLnBrk="0" hangingPunct="1">
+              <a:spcBef>
+                <a:spcPct val="0"/>
+              </a:spcBef>
+              <a:buNone/>
+              <a:defRPr sz="3200" b="0" kern="1200" cap="all">
+                <a:ln w="3175" cmpd="sng">
+                  <a:noFill/>
+                </a:ln>
+                <a:solidFill>
+                  <a:schemeClr val="tx1"/>
+                </a:solidFill>
+                <a:effectLst/>
+                <a:latin typeface="+mj-lt"/>
+                <a:ea typeface="+mj-ea"/>
+                <a:cs typeface="+mj-cs"/>
+              </a:defRPr>
+            </a:lvl1pPr>
+            <a:lvl2pPr eaLnBrk="1" hangingPunct="1">
+              <a:defRPr>
+                <a:solidFill>
+                  <a:schemeClr val="tx2"/>
+                </a:solidFill>
+              </a:defRPr>
+            </a:lvl2pPr>
+            <a:lvl3pPr eaLnBrk="1" hangingPunct="1">
+              <a:defRPr>
+                <a:solidFill>
+                  <a:schemeClr val="tx2"/>
+                </a:solidFill>
+              </a:defRPr>
+            </a:lvl3pPr>
+            <a:lvl4pPr eaLnBrk="1" hangingPunct="1">
+              <a:defRPr>
+                <a:solidFill>
+                  <a:schemeClr val="tx2"/>
+                </a:solidFill>
+              </a:defRPr>
+            </a:lvl4pPr>
+            <a:lvl5pPr eaLnBrk="1" hangingPunct="1">
+              <a:defRPr>
+                <a:solidFill>
+                  <a:schemeClr val="tx2"/>
+                </a:solidFill>
+              </a:defRPr>
+            </a:lvl5pPr>
+            <a:lvl6pPr eaLnBrk="1" hangingPunct="1">
+              <a:defRPr>
+                <a:solidFill>
+                  <a:schemeClr val="tx2"/>
+                </a:solidFill>
+              </a:defRPr>
+            </a:lvl6pPr>
+            <a:lvl7pPr eaLnBrk="1" hangingPunct="1">
+              <a:defRPr>
+                <a:solidFill>
+                  <a:schemeClr val="tx2"/>
+                </a:solidFill>
+              </a:defRPr>
+            </a:lvl7pPr>
+            <a:lvl8pPr eaLnBrk="1" hangingPunct="1">
+              <a:defRPr>
+                <a:solidFill>
+                  <a:schemeClr val="tx2"/>
+                </a:solidFill>
+              </a:defRPr>
+            </a:lvl8pPr>
+            <a:lvl9pPr eaLnBrk="1" hangingPunct="1">
+              <a:defRPr>
+                <a:solidFill>
+                  <a:schemeClr val="tx2"/>
+                </a:solidFill>
+              </a:defRPr>
+            </a:lvl9pPr>
+          </a:lstStyle>
+          <a:p>
+            <a:r>
+              <a:rPr lang="de-DE" cap="none" dirty="0"/>
+              <a:t>Hauptaugenmerk:</a:t>
+            </a:r>
+          </a:p>
+          <a:p>
+            <a:endParaRPr lang="de-DE" cap="none" dirty="0"/>
+          </a:p>
+          <a:p>
+            <a:pPr marL="457200" indent="-457200">
+              <a:buFont typeface="Arial" panose="020B0604020202020204" pitchFamily="34" charset="0"/>
+              <a:buChar char="•"/>
+            </a:pPr>
+            <a:r>
+              <a:rPr lang="de-DE" cap="none" dirty="0"/>
+              <a:t>einfache Bedienbarkeit (Usability)</a:t>
+            </a:r>
+          </a:p>
+          <a:p>
+            <a:pPr marL="457200" indent="-457200">
+              <a:buFont typeface="Arial" panose="020B0604020202020204" pitchFamily="34" charset="0"/>
+              <a:buChar char="•"/>
+            </a:pPr>
+            <a:r>
+              <a:rPr lang="de-DE" cap="none" dirty="0"/>
+              <a:t>intuitive Nutzung</a:t>
+            </a:r>
           </a:p>
         </p:txBody>
       </p:sp>
@@ -8366,248 +9453,6 @@
     <p:extLst>
       <p:ext uri="{BB962C8B-B14F-4D97-AF65-F5344CB8AC3E}">
         <p14:creationId xmlns:p14="http://schemas.microsoft.com/office/powerpoint/2010/main" val="1795233669"/>
-      </p:ext>
-    </p:extLst>
-  </p:cSld>
-  <p:clrMapOvr>
-    <a:masterClrMapping/>
-  </p:clrMapOvr>
-</p:sld>
-</file>
-
-<file path=ppt/slides/slide5.xml><?xml version="1.0" encoding="utf-8"?>
-<p:sld xmlns:a="http://schemas.openxmlformats.org/drawingml/2006/main" xmlns:r="http://schemas.openxmlformats.org/officeDocument/2006/relationships" xmlns:p="http://schemas.openxmlformats.org/presentationml/2006/main">
-  <p:cSld>
-    <p:spTree>
-      <p:nvGrpSpPr>
-        <p:cNvPr id="1" name=""/>
-        <p:cNvGrpSpPr/>
-        <p:nvPr/>
-      </p:nvGrpSpPr>
-      <p:grpSpPr>
-        <a:xfrm>
-          <a:off x="0" y="0"/>
-          <a:ext cx="0" cy="0"/>
-          <a:chOff x="0" y="0"/>
-          <a:chExt cx="0" cy="0"/>
-        </a:xfrm>
-      </p:grpSpPr>
-      <p:sp>
-        <p:nvSpPr>
-          <p:cNvPr id="4" name="Titel 3">
-            <a:extLst>
-              <a:ext uri="{FF2B5EF4-FFF2-40B4-BE49-F238E27FC236}">
-                <a16:creationId xmlns:a16="http://schemas.microsoft.com/office/drawing/2014/main" id="{84C68109-468E-4320-A347-CD61565ABD8B}"/>
-              </a:ext>
-            </a:extLst>
-          </p:cNvPr>
-          <p:cNvSpPr>
-            <a:spLocks noGrp="1"/>
-          </p:cNvSpPr>
-          <p:nvPr>
-            <p:ph type="title"/>
-          </p:nvPr>
-        </p:nvSpPr>
-        <p:spPr/>
-        <p:txBody>
-          <a:bodyPr/>
-          <a:lstStyle/>
-          <a:p>
-            <a:r>
-              <a:rPr lang="de-DE" dirty="0"/>
-              <a:t>Use </a:t>
-            </a:r>
-            <a:r>
-              <a:rPr lang="de-DE" dirty="0" err="1"/>
-              <a:t>cases</a:t>
-            </a:r>
-            <a:r>
-              <a:rPr lang="de-DE" dirty="0"/>
-              <a:t> &amp; </a:t>
-            </a:r>
-            <a:r>
-              <a:rPr lang="de-DE" dirty="0" err="1"/>
-              <a:t>Product</a:t>
-            </a:r>
-            <a:r>
-              <a:rPr lang="de-DE" dirty="0"/>
-              <a:t> Backlog</a:t>
-            </a:r>
-          </a:p>
-        </p:txBody>
-      </p:sp>
-      <p:sp>
-        <p:nvSpPr>
-          <p:cNvPr id="5" name="Textplatzhalter 4">
-            <a:extLst>
-              <a:ext uri="{FF2B5EF4-FFF2-40B4-BE49-F238E27FC236}">
-                <a16:creationId xmlns:a16="http://schemas.microsoft.com/office/drawing/2014/main" id="{E127A5F6-278C-46F5-B682-739817FF04BE}"/>
-              </a:ext>
-            </a:extLst>
-          </p:cNvPr>
-          <p:cNvSpPr>
-            <a:spLocks noGrp="1"/>
-          </p:cNvSpPr>
-          <p:nvPr>
-            <p:ph type="body" idx="1"/>
-          </p:nvPr>
-        </p:nvSpPr>
-        <p:spPr/>
-        <p:txBody>
-          <a:bodyPr/>
-          <a:lstStyle/>
-          <a:p>
-            <a:r>
-              <a:rPr lang="de-DE" dirty="0"/>
-              <a:t>Orlando </a:t>
-            </a:r>
-            <a:r>
-              <a:rPr lang="de-DE" dirty="0" err="1"/>
-              <a:t>Jähde</a:t>
-            </a:r>
-            <a:r>
-              <a:rPr lang="de-DE" dirty="0"/>
-              <a:t> / </a:t>
-            </a:r>
-            <a:r>
-              <a:rPr lang="de-DE" dirty="0" err="1"/>
-              <a:t>Requirements</a:t>
-            </a:r>
-            <a:r>
-              <a:rPr lang="de-DE" dirty="0"/>
-              <a:t> Engineer. </a:t>
-            </a:r>
-          </a:p>
-        </p:txBody>
-      </p:sp>
-      <p:sp>
-        <p:nvSpPr>
-          <p:cNvPr id="2" name="Fußzeilenplatzhalter 1">
-            <a:extLst>
-              <a:ext uri="{FF2B5EF4-FFF2-40B4-BE49-F238E27FC236}">
-                <a16:creationId xmlns:a16="http://schemas.microsoft.com/office/drawing/2014/main" id="{306E8936-FEFA-4DDD-A3E6-EB4DE1F01174}"/>
-              </a:ext>
-            </a:extLst>
-          </p:cNvPr>
-          <p:cNvSpPr>
-            <a:spLocks noGrp="1"/>
-          </p:cNvSpPr>
-          <p:nvPr>
-            <p:ph type="ftr" sz="quarter" idx="11"/>
-          </p:nvPr>
-        </p:nvSpPr>
-        <p:spPr/>
-        <p:txBody>
-          <a:bodyPr/>
-          <a:lstStyle/>
-          <a:p>
-            <a:r>
-              <a:rPr lang="en-US"/>
-              <a:t>KA-Share</a:t>
-            </a:r>
-            <a:endParaRPr lang="en-US" dirty="0"/>
-          </a:p>
-        </p:txBody>
-      </p:sp>
-      <p:sp>
-        <p:nvSpPr>
-          <p:cNvPr id="3" name="Datumsplatzhalter 2">
-            <a:extLst>
-              <a:ext uri="{FF2B5EF4-FFF2-40B4-BE49-F238E27FC236}">
-                <a16:creationId xmlns:a16="http://schemas.microsoft.com/office/drawing/2014/main" id="{4C032F13-4FCD-45A5-B5A7-EA3E25D97440}"/>
-              </a:ext>
-            </a:extLst>
-          </p:cNvPr>
-          <p:cNvSpPr>
-            <a:spLocks noGrp="1"/>
-          </p:cNvSpPr>
-          <p:nvPr>
-            <p:ph type="dt" sz="half" idx="10"/>
-          </p:nvPr>
-        </p:nvSpPr>
-        <p:spPr/>
-        <p:txBody>
-          <a:bodyPr/>
-          <a:lstStyle/>
-          <a:p>
-            <a:r>
-              <a:rPr lang="de-DE"/>
-              <a:t>11.02.2019</a:t>
-            </a:r>
-            <a:endParaRPr lang="en-US" dirty="0"/>
-          </a:p>
-        </p:txBody>
-      </p:sp>
-      <p:pic>
-        <p:nvPicPr>
-          <p:cNvPr id="6" name="Grafik 5" descr="Auto">
-            <a:extLst>
-              <a:ext uri="{FF2B5EF4-FFF2-40B4-BE49-F238E27FC236}">
-                <a16:creationId xmlns:a16="http://schemas.microsoft.com/office/drawing/2014/main" id="{2AEF1B7A-EF9B-4553-BDEE-5CE100830634}"/>
-              </a:ext>
-            </a:extLst>
-          </p:cNvPr>
-          <p:cNvPicPr>
-            <a:picLocks noChangeAspect="1"/>
-          </p:cNvPicPr>
-          <p:nvPr/>
-        </p:nvPicPr>
-        <p:blipFill>
-          <a:blip r:embed="rId2">
-            <a:extLst>
-              <a:ext uri="{96DAC541-7B7A-43D3-8B79-37D633B846F1}">
-                <asvg:svgBlip xmlns:asvg="http://schemas.microsoft.com/office/drawing/2016/SVG/main" r:embed="rId3"/>
-              </a:ext>
-            </a:extLst>
-          </a:blip>
-          <a:stretch>
-            <a:fillRect/>
-          </a:stretch>
-        </p:blipFill>
-        <p:spPr>
-          <a:xfrm rot="18952507">
-            <a:off x="10890173" y="2415118"/>
-            <a:ext cx="1228875" cy="1228875"/>
-          </a:xfrm>
-          <a:prstGeom prst="rect">
-            <a:avLst/>
-          </a:prstGeom>
-        </p:spPr>
-      </p:pic>
-      <p:sp>
-        <p:nvSpPr>
-          <p:cNvPr id="7" name="Foliennummernplatzhalter 6">
-            <a:extLst>
-              <a:ext uri="{FF2B5EF4-FFF2-40B4-BE49-F238E27FC236}">
-                <a16:creationId xmlns:a16="http://schemas.microsoft.com/office/drawing/2014/main" id="{68C30B81-E412-473B-9A64-1F79562133A3}"/>
-              </a:ext>
-            </a:extLst>
-          </p:cNvPr>
-          <p:cNvSpPr>
-            <a:spLocks noGrp="1"/>
-          </p:cNvSpPr>
-          <p:nvPr>
-            <p:ph type="sldNum" sz="quarter" idx="12"/>
-          </p:nvPr>
-        </p:nvSpPr>
-        <p:spPr/>
-        <p:txBody>
-          <a:bodyPr/>
-          <a:lstStyle/>
-          <a:p>
-            <a:fld id="{D57F1E4F-1CFF-5643-939E-217C01CDF565}" type="slidenum">
-              <a:rPr lang="en-US" smtClean="0"/>
-              <a:pPr/>
-              <a:t>5</a:t>
-            </a:fld>
-            <a:endParaRPr lang="en-US" dirty="0"/>
-          </a:p>
-        </p:txBody>
-      </p:sp>
-    </p:spTree>
-    <p:extLst>
-      <p:ext uri="{BB962C8B-B14F-4D97-AF65-F5344CB8AC3E}">
-        <p14:creationId xmlns:p14="http://schemas.microsoft.com/office/powerpoint/2010/main" val="3105482310"/>
       </p:ext>
     </p:extLst>
   </p:cSld>
@@ -8636,10 +9481,10 @@
       </p:grpSpPr>
       <p:sp>
         <p:nvSpPr>
-          <p:cNvPr id="4" name="Titel 3">
+          <p:cNvPr id="2" name="Fußzeilenplatzhalter 1">
             <a:extLst>
               <a:ext uri="{FF2B5EF4-FFF2-40B4-BE49-F238E27FC236}">
-                <a16:creationId xmlns:a16="http://schemas.microsoft.com/office/drawing/2014/main" id="{84C68109-468E-4320-A347-CD61565ABD8B}"/>
+                <a16:creationId xmlns:a16="http://schemas.microsoft.com/office/drawing/2014/main" id="{E7E1272E-DBA6-4C09-A303-DD0B15BECA8F}"/>
               </a:ext>
             </a:extLst>
           </p:cNvPr>
@@ -8647,62 +9492,6 @@
             <a:spLocks noGrp="1"/>
           </p:cNvSpPr>
           <p:nvPr>
-            <p:ph type="title"/>
-          </p:nvPr>
-        </p:nvSpPr>
-        <p:spPr/>
-        <p:txBody>
-          <a:bodyPr/>
-          <a:lstStyle/>
-          <a:p>
-            <a:r>
-              <a:rPr lang="de-DE" dirty="0"/>
-              <a:t>IT-Architektur</a:t>
-            </a:r>
-          </a:p>
-        </p:txBody>
-      </p:sp>
-      <p:sp>
-        <p:nvSpPr>
-          <p:cNvPr id="5" name="Textplatzhalter 4">
-            <a:extLst>
-              <a:ext uri="{FF2B5EF4-FFF2-40B4-BE49-F238E27FC236}">
-                <a16:creationId xmlns:a16="http://schemas.microsoft.com/office/drawing/2014/main" id="{E127A5F6-278C-46F5-B682-739817FF04BE}"/>
-              </a:ext>
-            </a:extLst>
-          </p:cNvPr>
-          <p:cNvSpPr>
-            <a:spLocks noGrp="1"/>
-          </p:cNvSpPr>
-          <p:nvPr>
-            <p:ph type="body" idx="1"/>
-          </p:nvPr>
-        </p:nvSpPr>
-        <p:spPr/>
-        <p:txBody>
-          <a:bodyPr/>
-          <a:lstStyle/>
-          <a:p>
-            <a:r>
-              <a:rPr lang="de-DE" b="1" dirty="0"/>
-              <a:t>Domenik Kunzmann / IT-Architekt</a:t>
-            </a:r>
-          </a:p>
-        </p:txBody>
-      </p:sp>
-      <p:sp>
-        <p:nvSpPr>
-          <p:cNvPr id="2" name="Fußzeilenplatzhalter 1">
-            <a:extLst>
-              <a:ext uri="{FF2B5EF4-FFF2-40B4-BE49-F238E27FC236}">
-                <a16:creationId xmlns:a16="http://schemas.microsoft.com/office/drawing/2014/main" id="{FEE19599-E843-4699-BB14-BFFA47EE594B}"/>
-              </a:ext>
-            </a:extLst>
-          </p:cNvPr>
-          <p:cNvSpPr>
-            <a:spLocks noGrp="1"/>
-          </p:cNvSpPr>
-          <p:nvPr>
             <p:ph type="ftr" sz="quarter" idx="11"/>
           </p:nvPr>
         </p:nvSpPr>
@@ -8724,7 +9513,7 @@
           <p:cNvPr id="3" name="Datumsplatzhalter 2">
             <a:extLst>
               <a:ext uri="{FF2B5EF4-FFF2-40B4-BE49-F238E27FC236}">
-                <a16:creationId xmlns:a16="http://schemas.microsoft.com/office/drawing/2014/main" id="{4C0874B5-6CE0-4569-96F9-A299B8752E77}"/>
+                <a16:creationId xmlns:a16="http://schemas.microsoft.com/office/drawing/2014/main" id="{2DFD3153-86A9-4D4B-A1DF-7A2F6F0BA133}"/>
               </a:ext>
             </a:extLst>
           </p:cNvPr>
@@ -8753,7 +9542,7 @@
           <p:cNvPr id="6" name="Grafik 5" descr="Auto">
             <a:extLst>
               <a:ext uri="{FF2B5EF4-FFF2-40B4-BE49-F238E27FC236}">
-                <a16:creationId xmlns:a16="http://schemas.microsoft.com/office/drawing/2014/main" id="{60F30CBD-42F4-4C44-974C-BC1991F6839A}"/>
+                <a16:creationId xmlns:a16="http://schemas.microsoft.com/office/drawing/2014/main" id="{BB1CAF7E-22C8-4388-9AE5-9DB1D0690E8D}"/>
               </a:ext>
             </a:extLst>
           </p:cNvPr>
@@ -8789,7 +9578,7 @@
           <p:cNvPr id="7" name="Foliennummernplatzhalter 6">
             <a:extLst>
               <a:ext uri="{FF2B5EF4-FFF2-40B4-BE49-F238E27FC236}">
-                <a16:creationId xmlns:a16="http://schemas.microsoft.com/office/drawing/2014/main" id="{53C64041-F474-4836-AAA7-EDDA382CA278}"/>
+                <a16:creationId xmlns:a16="http://schemas.microsoft.com/office/drawing/2014/main" id="{34ED39B3-FC6D-4359-BCAC-59F383486987}"/>
               </a:ext>
             </a:extLst>
           </p:cNvPr>
@@ -8814,10 +9603,39 @@
           </a:p>
         </p:txBody>
       </p:sp>
+      <p:pic>
+        <p:nvPicPr>
+          <p:cNvPr id="14" name="Grafik 13" descr="Ein Bild, das Screenshot enthält.&#10;&#10;Automatisch generierte Beschreibung">
+            <a:extLst>
+              <a:ext uri="{FF2B5EF4-FFF2-40B4-BE49-F238E27FC236}">
+                <a16:creationId xmlns:a16="http://schemas.microsoft.com/office/drawing/2014/main" id="{3B1EAFDF-EF42-40F1-B6F8-59198E81F252}"/>
+              </a:ext>
+            </a:extLst>
+          </p:cNvPr>
+          <p:cNvPicPr>
+            <a:picLocks noChangeAspect="1"/>
+          </p:cNvPicPr>
+          <p:nvPr/>
+        </p:nvPicPr>
+        <p:blipFill rotWithShape="1">
+          <a:blip r:embed="rId4"/>
+          <a:srcRect l="2570" t="1730" r="1299" b="17578"/>
+          <a:stretch/>
+        </p:blipFill>
+        <p:spPr>
+          <a:xfrm>
+            <a:off x="2144196" y="135649"/>
+            <a:ext cx="6886682" cy="6421365"/>
+          </a:xfrm>
+          <a:prstGeom prst="rect">
+            <a:avLst/>
+          </a:prstGeom>
+        </p:spPr>
+      </p:pic>
     </p:spTree>
     <p:extLst>
       <p:ext uri="{BB962C8B-B14F-4D97-AF65-F5344CB8AC3E}">
-        <p14:creationId xmlns:p14="http://schemas.microsoft.com/office/powerpoint/2010/main" val="2766168185"/>
+        <p14:creationId xmlns:p14="http://schemas.microsoft.com/office/powerpoint/2010/main" val="3243786135"/>
       </p:ext>
     </p:extLst>
   </p:cSld>
@@ -8846,10 +9664,10 @@
       </p:grpSpPr>
       <p:sp>
         <p:nvSpPr>
-          <p:cNvPr id="4" name="Titel 3">
+          <p:cNvPr id="2" name="Fußzeilenplatzhalter 1">
             <a:extLst>
               <a:ext uri="{FF2B5EF4-FFF2-40B4-BE49-F238E27FC236}">
-                <a16:creationId xmlns:a16="http://schemas.microsoft.com/office/drawing/2014/main" id="{84C68109-468E-4320-A347-CD61565ABD8B}"/>
+                <a16:creationId xmlns:a16="http://schemas.microsoft.com/office/drawing/2014/main" id="{E7E1272E-DBA6-4C09-A303-DD0B15BECA8F}"/>
               </a:ext>
             </a:extLst>
           </p:cNvPr>
@@ -8857,32 +9675,28 @@
             <a:spLocks noGrp="1"/>
           </p:cNvSpPr>
           <p:nvPr>
-            <p:ph type="title"/>
-          </p:nvPr>
-        </p:nvSpPr>
-        <p:spPr>
-          <a:xfrm>
-            <a:off x="684212" y="4487333"/>
-            <a:ext cx="8534400" cy="1058268"/>
-          </a:xfrm>
-        </p:spPr>
+            <p:ph type="ftr" sz="quarter" idx="11"/>
+          </p:nvPr>
+        </p:nvSpPr>
+        <p:spPr/>
         <p:txBody>
           <a:bodyPr/>
           <a:lstStyle/>
           <a:p>
             <a:r>
-              <a:rPr lang="de-DE" dirty="0"/>
-              <a:t>Datenbank</a:t>
-            </a:r>
-          </a:p>
-        </p:txBody>
-      </p:sp>
-      <p:sp>
-        <p:nvSpPr>
-          <p:cNvPr id="2" name="Datumsplatzhalter 1">
+              <a:rPr lang="en-US"/>
+              <a:t>KA-Share</a:t>
+            </a:r>
+            <a:endParaRPr lang="en-US" dirty="0"/>
+          </a:p>
+        </p:txBody>
+      </p:sp>
+      <p:sp>
+        <p:nvSpPr>
+          <p:cNvPr id="3" name="Datumsplatzhalter 2">
             <a:extLst>
               <a:ext uri="{FF2B5EF4-FFF2-40B4-BE49-F238E27FC236}">
-                <a16:creationId xmlns:a16="http://schemas.microsoft.com/office/drawing/2014/main" id="{B7F37089-E0D7-4721-9818-6F58D6F24ED4}"/>
+                <a16:creationId xmlns:a16="http://schemas.microsoft.com/office/drawing/2014/main" id="{2DFD3153-86A9-4D4B-A1DF-7A2F6F0BA133}"/>
               </a:ext>
             </a:extLst>
           </p:cNvPr>
@@ -8906,85 +9720,12 @@
           </a:p>
         </p:txBody>
       </p:sp>
-      <p:sp>
-        <p:nvSpPr>
-          <p:cNvPr id="6" name="Fußzeilenplatzhalter 5">
+      <p:pic>
+        <p:nvPicPr>
+          <p:cNvPr id="6" name="Grafik 5" descr="Auto">
             <a:extLst>
               <a:ext uri="{FF2B5EF4-FFF2-40B4-BE49-F238E27FC236}">
-                <a16:creationId xmlns:a16="http://schemas.microsoft.com/office/drawing/2014/main" id="{EEC4A702-6041-4042-9E95-76C25F4F7EE1}"/>
-              </a:ext>
-            </a:extLst>
-          </p:cNvPr>
-          <p:cNvSpPr>
-            <a:spLocks noGrp="1"/>
-          </p:cNvSpPr>
-          <p:nvPr>
-            <p:ph type="ftr" sz="quarter" idx="11"/>
-          </p:nvPr>
-        </p:nvSpPr>
-        <p:spPr/>
-        <p:txBody>
-          <a:bodyPr/>
-          <a:lstStyle/>
-          <a:p>
-            <a:r>
-              <a:rPr lang="en-US">
-                <a:solidFill>
-                  <a:schemeClr val="tx2">
-                    <a:lumMod val="20000"/>
-                    <a:lumOff val="80000"/>
-                  </a:schemeClr>
-                </a:solidFill>
-              </a:rPr>
-              <a:t>KA-Share</a:t>
-            </a:r>
-            <a:endParaRPr lang="en-US" dirty="0">
-              <a:solidFill>
-                <a:schemeClr val="tx2">
-                  <a:lumMod val="20000"/>
-                  <a:lumOff val="80000"/>
-                </a:schemeClr>
-              </a:solidFill>
-            </a:endParaRPr>
-          </a:p>
-        </p:txBody>
-      </p:sp>
-      <p:sp>
-        <p:nvSpPr>
-          <p:cNvPr id="3" name="Foliennummernplatzhalter 2">
-            <a:extLst>
-              <a:ext uri="{FF2B5EF4-FFF2-40B4-BE49-F238E27FC236}">
-                <a16:creationId xmlns:a16="http://schemas.microsoft.com/office/drawing/2014/main" id="{D0BBF157-124A-4B08-AF72-A5EF9841D304}"/>
-              </a:ext>
-            </a:extLst>
-          </p:cNvPr>
-          <p:cNvSpPr>
-            <a:spLocks noGrp="1"/>
-          </p:cNvSpPr>
-          <p:nvPr>
-            <p:ph type="sldNum" sz="quarter" idx="12"/>
-          </p:nvPr>
-        </p:nvSpPr>
-        <p:spPr/>
-        <p:txBody>
-          <a:bodyPr/>
-          <a:lstStyle/>
-          <a:p>
-            <a:fld id="{D57F1E4F-1CFF-5643-939E-217C01CDF565}" type="slidenum">
-              <a:rPr lang="en-US" smtClean="0"/>
-              <a:pPr/>
-              <a:t>7</a:t>
-            </a:fld>
-            <a:endParaRPr lang="en-US" dirty="0"/>
-          </a:p>
-        </p:txBody>
-      </p:sp>
-      <p:pic>
-        <p:nvPicPr>
-          <p:cNvPr id="7" name="Grafik 6" descr="Auto">
-            <a:extLst>
-              <a:ext uri="{FF2B5EF4-FFF2-40B4-BE49-F238E27FC236}">
-                <a16:creationId xmlns:a16="http://schemas.microsoft.com/office/drawing/2014/main" id="{E22131F2-98A3-4859-A680-0372D9EDC374}"/>
+                <a16:creationId xmlns:a16="http://schemas.microsoft.com/office/drawing/2014/main" id="{BB1CAF7E-22C8-4388-9AE5-9DB1D0690E8D}"/>
               </a:ext>
             </a:extLst>
           </p:cNvPr>
@@ -9017,278 +9758,157 @@
       </p:pic>
       <p:sp>
         <p:nvSpPr>
-          <p:cNvPr id="18" name="Textplatzhalter 4">
+          <p:cNvPr id="7" name="Foliennummernplatzhalter 6">
             <a:extLst>
               <a:ext uri="{FF2B5EF4-FFF2-40B4-BE49-F238E27FC236}">
-                <a16:creationId xmlns:a16="http://schemas.microsoft.com/office/drawing/2014/main" id="{79A759CD-A5B6-45B0-93FC-60D96E4FBB0A}"/>
+                <a16:creationId xmlns:a16="http://schemas.microsoft.com/office/drawing/2014/main" id="{34ED39B3-FC6D-4359-BCAC-59F383486987}"/>
               </a:ext>
             </a:extLst>
           </p:cNvPr>
-          <p:cNvSpPr txBox="1">
-            <a:spLocks/>
-          </p:cNvSpPr>
+          <p:cNvSpPr>
+            <a:spLocks noGrp="1"/>
+          </p:cNvSpPr>
+          <p:nvPr>
+            <p:ph type="sldNum" sz="quarter" idx="12"/>
+          </p:nvPr>
+        </p:nvSpPr>
+        <p:spPr/>
+        <p:txBody>
+          <a:bodyPr/>
+          <a:lstStyle/>
+          <a:p>
+            <a:fld id="{D57F1E4F-1CFF-5643-939E-217C01CDF565}" type="slidenum">
+              <a:rPr lang="en-US" smtClean="0"/>
+              <a:pPr/>
+              <a:t>7</a:t>
+            </a:fld>
+            <a:endParaRPr lang="en-US" dirty="0"/>
+          </a:p>
+        </p:txBody>
+      </p:sp>
+      <p:pic>
+        <p:nvPicPr>
+          <p:cNvPr id="5" name="Grafik 4" descr="Ein Bild, das Screenshot enthält.&#10;&#10;Automatisch generierte Beschreibung">
+            <a:extLst>
+              <a:ext uri="{FF2B5EF4-FFF2-40B4-BE49-F238E27FC236}">
+                <a16:creationId xmlns:a16="http://schemas.microsoft.com/office/drawing/2014/main" id="{CB846A31-7A03-44F6-9403-62EDB85613CE}"/>
+              </a:ext>
+            </a:extLst>
+          </p:cNvPr>
+          <p:cNvPicPr>
+            <a:picLocks noChangeAspect="1"/>
+          </p:cNvPicPr>
           <p:nvPr/>
-        </p:nvSpPr>
+        </p:nvPicPr>
+        <p:blipFill rotWithShape="1">
+          <a:blip r:embed="rId4"/>
+          <a:srcRect l="3470" t="2521" r="2267" b="4989"/>
+          <a:stretch/>
+        </p:blipFill>
         <p:spPr>
           <a:xfrm>
-            <a:off x="684211" y="5251507"/>
-            <a:ext cx="8535990" cy="741873"/>
+            <a:off x="2448852" y="207350"/>
+            <a:ext cx="6344240" cy="6386399"/>
           </a:xfrm>
           <a:prstGeom prst="rect">
             <a:avLst/>
           </a:prstGeom>
         </p:spPr>
-        <p:txBody>
-          <a:bodyPr vert="horz" lIns="91440" tIns="45720" rIns="91440" bIns="45720" rtlCol="0" anchor="ctr">
-            <a:normAutofit/>
-          </a:bodyPr>
-          <a:lstStyle>
-            <a:lvl1pPr marL="285750" indent="-285750" algn="l" defTabSz="457200" rtl="0" eaLnBrk="1" latinLnBrk="0" hangingPunct="1">
-              <a:spcBef>
-                <a:spcPct val="20000"/>
-              </a:spcBef>
-              <a:spcAft>
-                <a:spcPts val="600"/>
-              </a:spcAft>
-              <a:buClr>
-                <a:schemeClr val="tx1"/>
-              </a:buClr>
-              <a:buSzPct val="80000"/>
-              <a:buFont typeface="Wingdings 3" panose="05040102010807070707" pitchFamily="18" charset="2"/>
-              <a:buChar char=""/>
-              <a:defRPr sz="2000" kern="1200" cap="none">
-                <a:solidFill>
-                  <a:schemeClr val="bg2">
-                    <a:lumMod val="75000"/>
-                  </a:schemeClr>
-                </a:solidFill>
-                <a:effectLst/>
-                <a:latin typeface="+mn-lt"/>
-                <a:ea typeface="+mn-ea"/>
-                <a:cs typeface="+mn-cs"/>
-              </a:defRPr>
-            </a:lvl1pPr>
-            <a:lvl2pPr marL="742950" indent="-285750" algn="l" defTabSz="457200" rtl="0" eaLnBrk="1" latinLnBrk="0" hangingPunct="1">
-              <a:spcBef>
-                <a:spcPct val="20000"/>
-              </a:spcBef>
-              <a:spcAft>
-                <a:spcPts val="600"/>
-              </a:spcAft>
-              <a:buClr>
-                <a:schemeClr val="tx1"/>
-              </a:buClr>
-              <a:buSzPct val="80000"/>
-              <a:buFont typeface="Wingdings 3" panose="05040102010807070707" pitchFamily="18" charset="2"/>
-              <a:buChar char=""/>
-              <a:defRPr sz="1800" kern="1200" cap="none">
-                <a:solidFill>
-                  <a:schemeClr val="bg2">
-                    <a:lumMod val="75000"/>
-                  </a:schemeClr>
-                </a:solidFill>
-                <a:effectLst/>
-                <a:latin typeface="+mn-lt"/>
-                <a:ea typeface="+mn-ea"/>
-                <a:cs typeface="+mn-cs"/>
-              </a:defRPr>
-            </a:lvl2pPr>
-            <a:lvl3pPr marL="1200150" indent="-285750" algn="l" defTabSz="457200" rtl="0" eaLnBrk="1" latinLnBrk="0" hangingPunct="1">
-              <a:spcBef>
-                <a:spcPct val="20000"/>
-              </a:spcBef>
-              <a:spcAft>
-                <a:spcPts val="600"/>
-              </a:spcAft>
-              <a:buClr>
-                <a:schemeClr val="tx1"/>
-              </a:buClr>
-              <a:buSzPct val="80000"/>
-              <a:buFont typeface="Wingdings 3" panose="05040102010807070707" pitchFamily="18" charset="2"/>
-              <a:buChar char=""/>
-              <a:defRPr sz="1600" kern="1200" cap="none">
-                <a:solidFill>
-                  <a:schemeClr val="bg2">
-                    <a:lumMod val="75000"/>
-                  </a:schemeClr>
-                </a:solidFill>
-                <a:effectLst/>
-                <a:latin typeface="+mn-lt"/>
-                <a:ea typeface="+mn-ea"/>
-                <a:cs typeface="+mn-cs"/>
-              </a:defRPr>
-            </a:lvl3pPr>
-            <a:lvl4pPr marL="1543050" indent="-171450" algn="l" defTabSz="457200" rtl="0" eaLnBrk="1" latinLnBrk="0" hangingPunct="1">
-              <a:spcBef>
-                <a:spcPct val="20000"/>
-              </a:spcBef>
-              <a:spcAft>
-                <a:spcPts val="600"/>
-              </a:spcAft>
-              <a:buClr>
-                <a:schemeClr val="tx1"/>
-              </a:buClr>
-              <a:buSzPct val="80000"/>
-              <a:buFont typeface="Wingdings 3" panose="05040102010807070707" pitchFamily="18" charset="2"/>
-              <a:buChar char=""/>
-              <a:defRPr sz="1400" kern="1200" cap="none">
-                <a:solidFill>
-                  <a:schemeClr val="bg2">
-                    <a:lumMod val="75000"/>
-                  </a:schemeClr>
-                </a:solidFill>
-                <a:effectLst/>
-                <a:latin typeface="+mn-lt"/>
-                <a:ea typeface="+mn-ea"/>
-                <a:cs typeface="+mn-cs"/>
-              </a:defRPr>
-            </a:lvl4pPr>
-            <a:lvl5pPr marL="2000250" indent="-171450" algn="l" defTabSz="457200" rtl="0" eaLnBrk="1" latinLnBrk="0" hangingPunct="1">
-              <a:spcBef>
-                <a:spcPct val="20000"/>
-              </a:spcBef>
-              <a:spcAft>
-                <a:spcPts val="600"/>
-              </a:spcAft>
-              <a:buClr>
-                <a:schemeClr val="tx1"/>
-              </a:buClr>
-              <a:buSzPct val="80000"/>
-              <a:buFont typeface="Wingdings 3" panose="05040102010807070707" pitchFamily="18" charset="2"/>
-              <a:buChar char=""/>
-              <a:defRPr sz="1400" kern="1200" cap="none">
-                <a:solidFill>
-                  <a:schemeClr val="bg2">
-                    <a:lumMod val="75000"/>
-                  </a:schemeClr>
-                </a:solidFill>
-                <a:effectLst/>
-                <a:latin typeface="+mn-lt"/>
-                <a:ea typeface="+mn-ea"/>
-                <a:cs typeface="+mn-cs"/>
-              </a:defRPr>
-            </a:lvl5pPr>
-            <a:lvl6pPr marL="2514600" indent="-228600" algn="l" defTabSz="457200" rtl="0" eaLnBrk="1" latinLnBrk="0" hangingPunct="1">
-              <a:spcBef>
-                <a:spcPct val="20000"/>
-              </a:spcBef>
-              <a:spcAft>
-                <a:spcPts val="600"/>
-              </a:spcAft>
-              <a:buClr>
-                <a:schemeClr val="tx1"/>
-              </a:buClr>
-              <a:buSzPct val="80000"/>
-              <a:buFont typeface="Wingdings 3" panose="05040102010807070707" pitchFamily="18" charset="2"/>
-              <a:buChar char=""/>
-              <a:defRPr sz="1400" kern="1200" cap="none">
-                <a:solidFill>
-                  <a:schemeClr val="bg2">
-                    <a:lumMod val="75000"/>
-                  </a:schemeClr>
-                </a:solidFill>
-                <a:effectLst/>
-                <a:latin typeface="+mn-lt"/>
-                <a:ea typeface="+mn-ea"/>
-                <a:cs typeface="+mn-cs"/>
-              </a:defRPr>
-            </a:lvl6pPr>
-            <a:lvl7pPr marL="2971800" indent="-228600" algn="l" defTabSz="457200" rtl="0" eaLnBrk="1" latinLnBrk="0" hangingPunct="1">
-              <a:spcBef>
-                <a:spcPct val="20000"/>
-              </a:spcBef>
-              <a:spcAft>
-                <a:spcPts val="600"/>
-              </a:spcAft>
-              <a:buClr>
-                <a:schemeClr val="tx1"/>
-              </a:buClr>
-              <a:buSzPct val="80000"/>
-              <a:buFont typeface="Wingdings 3" panose="05040102010807070707" pitchFamily="18" charset="2"/>
-              <a:buChar char=""/>
-              <a:defRPr sz="1400" kern="1200" cap="none">
-                <a:solidFill>
-                  <a:schemeClr val="bg2">
-                    <a:lumMod val="75000"/>
-                  </a:schemeClr>
-                </a:solidFill>
-                <a:effectLst/>
-                <a:latin typeface="+mn-lt"/>
-                <a:ea typeface="+mn-ea"/>
-                <a:cs typeface="+mn-cs"/>
-              </a:defRPr>
-            </a:lvl7pPr>
-            <a:lvl8pPr marL="3429000" indent="-228600" algn="l" defTabSz="457200" rtl="0" eaLnBrk="1" latinLnBrk="0" hangingPunct="1">
-              <a:spcBef>
-                <a:spcPct val="20000"/>
-              </a:spcBef>
-              <a:spcAft>
-                <a:spcPts val="600"/>
-              </a:spcAft>
-              <a:buClr>
-                <a:schemeClr val="tx1"/>
-              </a:buClr>
-              <a:buSzPct val="80000"/>
-              <a:buFont typeface="Wingdings 3" panose="05040102010807070707" pitchFamily="18" charset="2"/>
-              <a:buChar char=""/>
-              <a:defRPr sz="1400" kern="1200" cap="none">
-                <a:solidFill>
-                  <a:schemeClr val="bg2">
-                    <a:lumMod val="75000"/>
-                  </a:schemeClr>
-                </a:solidFill>
-                <a:effectLst/>
-                <a:latin typeface="+mn-lt"/>
-                <a:ea typeface="+mn-ea"/>
-                <a:cs typeface="+mn-cs"/>
-              </a:defRPr>
-            </a:lvl8pPr>
-            <a:lvl9pPr marL="3886200" indent="-228600" algn="l" defTabSz="457200" rtl="0" eaLnBrk="1" latinLnBrk="0" hangingPunct="1">
-              <a:spcBef>
-                <a:spcPct val="20000"/>
-              </a:spcBef>
-              <a:spcAft>
-                <a:spcPts val="600"/>
-              </a:spcAft>
-              <a:buClr>
-                <a:schemeClr val="tx1"/>
-              </a:buClr>
-              <a:buSzPct val="80000"/>
-              <a:buFont typeface="Wingdings 3" panose="05040102010807070707" pitchFamily="18" charset="2"/>
-              <a:buChar char=""/>
-              <a:defRPr sz="1400" kern="1200" cap="none">
-                <a:solidFill>
-                  <a:schemeClr val="bg2">
-                    <a:lumMod val="75000"/>
-                  </a:schemeClr>
-                </a:solidFill>
-                <a:effectLst/>
-                <a:latin typeface="+mn-lt"/>
-                <a:ea typeface="+mn-ea"/>
-                <a:cs typeface="+mn-cs"/>
-              </a:defRPr>
-            </a:lvl9pPr>
-          </a:lstStyle>
-          <a:p>
-            <a:pPr marL="0" indent="0">
-              <a:buNone/>
-            </a:pPr>
-            <a:r>
-              <a:rPr lang="de-DE" b="1" dirty="0"/>
-              <a:t>Benjamin Kanzler / Datenbank-Administrator</a:t>
-            </a:r>
-          </a:p>
-          <a:p>
-            <a:endParaRPr lang="de-DE" dirty="0"/>
+      </p:pic>
+    </p:spTree>
+    <p:extLst>
+      <p:ext uri="{BB962C8B-B14F-4D97-AF65-F5344CB8AC3E}">
+        <p14:creationId xmlns:p14="http://schemas.microsoft.com/office/powerpoint/2010/main" val="4261297377"/>
+      </p:ext>
+    </p:extLst>
+  </p:cSld>
+  <p:clrMapOvr>
+    <a:masterClrMapping/>
+  </p:clrMapOvr>
+</p:sld>
+</file>
+
+<file path=ppt/slides/slide8.xml><?xml version="1.0" encoding="utf-8"?>
+<p:sld xmlns:a="http://schemas.openxmlformats.org/drawingml/2006/main" xmlns:r="http://schemas.openxmlformats.org/officeDocument/2006/relationships" xmlns:p="http://schemas.openxmlformats.org/presentationml/2006/main">
+  <p:cSld>
+    <p:spTree>
+      <p:nvGrpSpPr>
+        <p:cNvPr id="1" name=""/>
+        <p:cNvGrpSpPr/>
+        <p:nvPr/>
+      </p:nvGrpSpPr>
+      <p:grpSpPr>
+        <a:xfrm>
+          <a:off x="0" y="0"/>
+          <a:ext cx="0" cy="0"/>
+          <a:chOff x="0" y="0"/>
+          <a:chExt cx="0" cy="0"/>
+        </a:xfrm>
+      </p:grpSpPr>
+      <p:sp>
+        <p:nvSpPr>
+          <p:cNvPr id="2" name="Fußzeilenplatzhalter 1">
+            <a:extLst>
+              <a:ext uri="{FF2B5EF4-FFF2-40B4-BE49-F238E27FC236}">
+                <a16:creationId xmlns:a16="http://schemas.microsoft.com/office/drawing/2014/main" id="{E7E1272E-DBA6-4C09-A303-DD0B15BECA8F}"/>
+              </a:ext>
+            </a:extLst>
+          </p:cNvPr>
+          <p:cNvSpPr>
+            <a:spLocks noGrp="1"/>
+          </p:cNvSpPr>
+          <p:nvPr>
+            <p:ph type="ftr" sz="quarter" idx="11"/>
+          </p:nvPr>
+        </p:nvSpPr>
+        <p:spPr/>
+        <p:txBody>
+          <a:bodyPr/>
+          <a:lstStyle/>
+          <a:p>
+            <a:r>
+              <a:rPr lang="en-US"/>
+              <a:t>KA-Share</a:t>
+            </a:r>
+            <a:endParaRPr lang="en-US" dirty="0"/>
+          </a:p>
+        </p:txBody>
+      </p:sp>
+      <p:sp>
+        <p:nvSpPr>
+          <p:cNvPr id="3" name="Datumsplatzhalter 2">
+            <a:extLst>
+              <a:ext uri="{FF2B5EF4-FFF2-40B4-BE49-F238E27FC236}">
+                <a16:creationId xmlns:a16="http://schemas.microsoft.com/office/drawing/2014/main" id="{2DFD3153-86A9-4D4B-A1DF-7A2F6F0BA133}"/>
+              </a:ext>
+            </a:extLst>
+          </p:cNvPr>
+          <p:cNvSpPr>
+            <a:spLocks noGrp="1"/>
+          </p:cNvSpPr>
+          <p:nvPr>
+            <p:ph type="dt" sz="half" idx="10"/>
+          </p:nvPr>
+        </p:nvSpPr>
+        <p:spPr/>
+        <p:txBody>
+          <a:bodyPr/>
+          <a:lstStyle/>
+          <a:p>
+            <a:r>
+              <a:rPr lang="de-DE"/>
+              <a:t>11.02.2019</a:t>
+            </a:r>
+            <a:endParaRPr lang="en-US" dirty="0"/>
           </a:p>
         </p:txBody>
       </p:sp>
       <p:pic>
         <p:nvPicPr>
-          <p:cNvPr id="8" name="Grafik 7">
+          <p:cNvPr id="6" name="Grafik 5" descr="Auto">
             <a:extLst>
               <a:ext uri="{FF2B5EF4-FFF2-40B4-BE49-F238E27FC236}">
-                <a16:creationId xmlns:a16="http://schemas.microsoft.com/office/drawing/2014/main" id="{7BF818BB-F74D-4A95-8DEF-EBB1B1B2133A}"/>
+                <a16:creationId xmlns:a16="http://schemas.microsoft.com/office/drawing/2014/main" id="{BB1CAF7E-22C8-4388-9AE5-9DB1D0690E8D}"/>
               </a:ext>
             </a:extLst>
           </p:cNvPr>
@@ -9298,15 +9918,80 @@
           <p:nvPr/>
         </p:nvPicPr>
         <p:blipFill>
-          <a:blip r:embed="rId4"/>
+          <a:blip r:embed="rId2">
+            <a:extLst>
+              <a:ext uri="{96DAC541-7B7A-43D3-8B79-37D633B846F1}">
+                <asvg:svgBlip xmlns:asvg="http://schemas.microsoft.com/office/drawing/2016/SVG/main" r:embed="rId3"/>
+              </a:ext>
+            </a:extLst>
+          </a:blip>
           <a:stretch>
             <a:fillRect/>
           </a:stretch>
         </p:blipFill>
         <p:spPr>
+          <a:xfrm rot="18952507">
+            <a:off x="10890173" y="2415118"/>
+            <a:ext cx="1228875" cy="1228875"/>
+          </a:xfrm>
+          <a:prstGeom prst="rect">
+            <a:avLst/>
+          </a:prstGeom>
+        </p:spPr>
+      </p:pic>
+      <p:sp>
+        <p:nvSpPr>
+          <p:cNvPr id="7" name="Foliennummernplatzhalter 6">
+            <a:extLst>
+              <a:ext uri="{FF2B5EF4-FFF2-40B4-BE49-F238E27FC236}">
+                <a16:creationId xmlns:a16="http://schemas.microsoft.com/office/drawing/2014/main" id="{34ED39B3-FC6D-4359-BCAC-59F383486987}"/>
+              </a:ext>
+            </a:extLst>
+          </p:cNvPr>
+          <p:cNvSpPr>
+            <a:spLocks noGrp="1"/>
+          </p:cNvSpPr>
+          <p:nvPr>
+            <p:ph type="sldNum" sz="quarter" idx="12"/>
+          </p:nvPr>
+        </p:nvSpPr>
+        <p:spPr/>
+        <p:txBody>
+          <a:bodyPr/>
+          <a:lstStyle/>
+          <a:p>
+            <a:fld id="{D57F1E4F-1CFF-5643-939E-217C01CDF565}" type="slidenum">
+              <a:rPr lang="en-US" smtClean="0"/>
+              <a:pPr/>
+              <a:t>8</a:t>
+            </a:fld>
+            <a:endParaRPr lang="en-US" dirty="0"/>
+          </a:p>
+        </p:txBody>
+      </p:sp>
+      <p:pic>
+        <p:nvPicPr>
+          <p:cNvPr id="5" name="Grafik 4" descr="Ein Bild, das Screenshot enthält.&#10;&#10;Automatisch generierte Beschreibung">
+            <a:extLst>
+              <a:ext uri="{FF2B5EF4-FFF2-40B4-BE49-F238E27FC236}">
+                <a16:creationId xmlns:a16="http://schemas.microsoft.com/office/drawing/2014/main" id="{2809B1C6-A8EB-4CA7-B4D3-0E616396B1CC}"/>
+              </a:ext>
+            </a:extLst>
+          </p:cNvPr>
+          <p:cNvPicPr>
+            <a:picLocks noChangeAspect="1"/>
+          </p:cNvPicPr>
+          <p:nvPr/>
+        </p:nvPicPr>
+        <p:blipFill rotWithShape="1">
+          <a:blip r:embed="rId4"/>
+          <a:srcRect l="4041" t="5364" r="3215" b="4778"/>
+          <a:stretch/>
+        </p:blipFill>
+        <p:spPr>
           <a:xfrm>
-            <a:off x="684211" y="444307"/>
-            <a:ext cx="8801319" cy="3864206"/>
+            <a:off x="1941922" y="160254"/>
+            <a:ext cx="7158114" cy="6174558"/>
           </a:xfrm>
           <a:prstGeom prst="rect">
             <a:avLst/>
@@ -9316,7 +10001,190 @@
     </p:spTree>
     <p:extLst>
       <p:ext uri="{BB962C8B-B14F-4D97-AF65-F5344CB8AC3E}">
-        <p14:creationId xmlns:p14="http://schemas.microsoft.com/office/powerpoint/2010/main" val="3846731267"/>
+        <p14:creationId xmlns:p14="http://schemas.microsoft.com/office/powerpoint/2010/main" val="3247810964"/>
+      </p:ext>
+    </p:extLst>
+  </p:cSld>
+  <p:clrMapOvr>
+    <a:masterClrMapping/>
+  </p:clrMapOvr>
+</p:sld>
+</file>
+
+<file path=ppt/slides/slide9.xml><?xml version="1.0" encoding="utf-8"?>
+<p:sld xmlns:a="http://schemas.openxmlformats.org/drawingml/2006/main" xmlns:r="http://schemas.openxmlformats.org/officeDocument/2006/relationships" xmlns:p="http://schemas.openxmlformats.org/presentationml/2006/main">
+  <p:cSld>
+    <p:spTree>
+      <p:nvGrpSpPr>
+        <p:cNvPr id="1" name=""/>
+        <p:cNvGrpSpPr/>
+        <p:nvPr/>
+      </p:nvGrpSpPr>
+      <p:grpSpPr>
+        <a:xfrm>
+          <a:off x="0" y="0"/>
+          <a:ext cx="0" cy="0"/>
+          <a:chOff x="0" y="0"/>
+          <a:chExt cx="0" cy="0"/>
+        </a:xfrm>
+      </p:grpSpPr>
+      <p:sp>
+        <p:nvSpPr>
+          <p:cNvPr id="2" name="Fußzeilenplatzhalter 1">
+            <a:extLst>
+              <a:ext uri="{FF2B5EF4-FFF2-40B4-BE49-F238E27FC236}">
+                <a16:creationId xmlns:a16="http://schemas.microsoft.com/office/drawing/2014/main" id="{E7E1272E-DBA6-4C09-A303-DD0B15BECA8F}"/>
+              </a:ext>
+            </a:extLst>
+          </p:cNvPr>
+          <p:cNvSpPr>
+            <a:spLocks noGrp="1"/>
+          </p:cNvSpPr>
+          <p:nvPr>
+            <p:ph type="ftr" sz="quarter" idx="11"/>
+          </p:nvPr>
+        </p:nvSpPr>
+        <p:spPr/>
+        <p:txBody>
+          <a:bodyPr/>
+          <a:lstStyle/>
+          <a:p>
+            <a:r>
+              <a:rPr lang="en-US"/>
+              <a:t>KA-Share</a:t>
+            </a:r>
+            <a:endParaRPr lang="en-US" dirty="0"/>
+          </a:p>
+        </p:txBody>
+      </p:sp>
+      <p:sp>
+        <p:nvSpPr>
+          <p:cNvPr id="3" name="Datumsplatzhalter 2">
+            <a:extLst>
+              <a:ext uri="{FF2B5EF4-FFF2-40B4-BE49-F238E27FC236}">
+                <a16:creationId xmlns:a16="http://schemas.microsoft.com/office/drawing/2014/main" id="{2DFD3153-86A9-4D4B-A1DF-7A2F6F0BA133}"/>
+              </a:ext>
+            </a:extLst>
+          </p:cNvPr>
+          <p:cNvSpPr>
+            <a:spLocks noGrp="1"/>
+          </p:cNvSpPr>
+          <p:nvPr>
+            <p:ph type="dt" sz="half" idx="10"/>
+          </p:nvPr>
+        </p:nvSpPr>
+        <p:spPr/>
+        <p:txBody>
+          <a:bodyPr/>
+          <a:lstStyle/>
+          <a:p>
+            <a:r>
+              <a:rPr lang="de-DE"/>
+              <a:t>11.02.2019</a:t>
+            </a:r>
+            <a:endParaRPr lang="en-US" dirty="0"/>
+          </a:p>
+        </p:txBody>
+      </p:sp>
+      <p:pic>
+        <p:nvPicPr>
+          <p:cNvPr id="6" name="Grafik 5" descr="Auto">
+            <a:extLst>
+              <a:ext uri="{FF2B5EF4-FFF2-40B4-BE49-F238E27FC236}">
+                <a16:creationId xmlns:a16="http://schemas.microsoft.com/office/drawing/2014/main" id="{BB1CAF7E-22C8-4388-9AE5-9DB1D0690E8D}"/>
+              </a:ext>
+            </a:extLst>
+          </p:cNvPr>
+          <p:cNvPicPr>
+            <a:picLocks noChangeAspect="1"/>
+          </p:cNvPicPr>
+          <p:nvPr/>
+        </p:nvPicPr>
+        <p:blipFill>
+          <a:blip r:embed="rId2">
+            <a:extLst>
+              <a:ext uri="{96DAC541-7B7A-43D3-8B79-37D633B846F1}">
+                <asvg:svgBlip xmlns:asvg="http://schemas.microsoft.com/office/drawing/2016/SVG/main" r:embed="rId3"/>
+              </a:ext>
+            </a:extLst>
+          </a:blip>
+          <a:stretch>
+            <a:fillRect/>
+          </a:stretch>
+        </p:blipFill>
+        <p:spPr>
+          <a:xfrm rot="18952507">
+            <a:off x="10890173" y="2415118"/>
+            <a:ext cx="1228875" cy="1228875"/>
+          </a:xfrm>
+          <a:prstGeom prst="rect">
+            <a:avLst/>
+          </a:prstGeom>
+        </p:spPr>
+      </p:pic>
+      <p:sp>
+        <p:nvSpPr>
+          <p:cNvPr id="7" name="Foliennummernplatzhalter 6">
+            <a:extLst>
+              <a:ext uri="{FF2B5EF4-FFF2-40B4-BE49-F238E27FC236}">
+                <a16:creationId xmlns:a16="http://schemas.microsoft.com/office/drawing/2014/main" id="{34ED39B3-FC6D-4359-BCAC-59F383486987}"/>
+              </a:ext>
+            </a:extLst>
+          </p:cNvPr>
+          <p:cNvSpPr>
+            <a:spLocks noGrp="1"/>
+          </p:cNvSpPr>
+          <p:nvPr>
+            <p:ph type="sldNum" sz="quarter" idx="12"/>
+          </p:nvPr>
+        </p:nvSpPr>
+        <p:spPr/>
+        <p:txBody>
+          <a:bodyPr/>
+          <a:lstStyle/>
+          <a:p>
+            <a:fld id="{D57F1E4F-1CFF-5643-939E-217C01CDF565}" type="slidenum">
+              <a:rPr lang="en-US" smtClean="0"/>
+              <a:pPr/>
+              <a:t>9</a:t>
+            </a:fld>
+            <a:endParaRPr lang="en-US" dirty="0"/>
+          </a:p>
+        </p:txBody>
+      </p:sp>
+      <p:pic>
+        <p:nvPicPr>
+          <p:cNvPr id="8" name="Grafik 7" descr="Ein Bild, das Screenshot enthält.&#10;&#10;Automatisch generierte Beschreibung">
+            <a:extLst>
+              <a:ext uri="{FF2B5EF4-FFF2-40B4-BE49-F238E27FC236}">
+                <a16:creationId xmlns:a16="http://schemas.microsoft.com/office/drawing/2014/main" id="{247DAF33-2F68-4465-98A3-E4F519807D6D}"/>
+              </a:ext>
+            </a:extLst>
+          </p:cNvPr>
+          <p:cNvPicPr>
+            <a:picLocks noChangeAspect="1"/>
+          </p:cNvPicPr>
+          <p:nvPr/>
+        </p:nvPicPr>
+        <p:blipFill rotWithShape="1">
+          <a:blip r:embed="rId4"/>
+          <a:srcRect l="1780" t="2801" r="2323" b="2477"/>
+          <a:stretch/>
+        </p:blipFill>
+        <p:spPr>
+          <a:xfrm>
+            <a:off x="1942044" y="203230"/>
+            <a:ext cx="6732166" cy="6256294"/>
+          </a:xfrm>
+          <a:prstGeom prst="rect">
+            <a:avLst/>
+          </a:prstGeom>
+        </p:spPr>
+      </p:pic>
+    </p:spTree>
+    <p:extLst>
+      <p:ext uri="{BB962C8B-B14F-4D97-AF65-F5344CB8AC3E}">
+        <p14:creationId xmlns:p14="http://schemas.microsoft.com/office/powerpoint/2010/main" val="3595189459"/>
       </p:ext>
     </p:extLst>
   </p:cSld>

</xml_diff>

<commit_message>
Agenda die Reihenfolge geändert
</commit_message>
<xml_diff>
--- a/Präsentation/Statuspräsentation1.pptx
+++ b/Präsentation/Statuspräsentation1.pptx
@@ -8909,6 +8909,35 @@
                   <a:schemeClr val="tx1"/>
                 </a:solidFill>
               </a:rPr>
+              <a:t>Use Cases &amp; </a:t>
+            </a:r>
+            <a:r>
+              <a:rPr lang="de-DE" sz="1800" dirty="0" err="1">
+                <a:solidFill>
+                  <a:schemeClr val="tx1"/>
+                </a:solidFill>
+              </a:rPr>
+              <a:t>Product</a:t>
+            </a:r>
+            <a:r>
+              <a:rPr lang="de-DE" sz="1800" dirty="0">
+                <a:solidFill>
+                  <a:schemeClr val="tx1"/>
+                </a:solidFill>
+              </a:rPr>
+              <a:t> Backlog</a:t>
+            </a:r>
+          </a:p>
+          <a:p>
+            <a:endParaRPr lang="de-DE" dirty="0"/>
+          </a:p>
+          <a:p>
+            <a:r>
+              <a:rPr lang="de-DE" sz="1800" dirty="0">
+                <a:solidFill>
+                  <a:schemeClr val="tx1"/>
+                </a:solidFill>
+              </a:rPr>
               <a:t>Mock-</a:t>
             </a:r>
             <a:r>
@@ -8924,35 +8953,6 @@
                 <a:schemeClr val="tx1"/>
               </a:solidFill>
             </a:endParaRPr>
-          </a:p>
-          <a:p>
-            <a:endParaRPr lang="de-DE" dirty="0"/>
-          </a:p>
-          <a:p>
-            <a:r>
-              <a:rPr lang="de-DE" sz="1800" dirty="0">
-                <a:solidFill>
-                  <a:schemeClr val="tx1"/>
-                </a:solidFill>
-              </a:rPr>
-              <a:t>Use Cases &amp; </a:t>
-            </a:r>
-            <a:r>
-              <a:rPr lang="de-DE" sz="1800" dirty="0" err="1">
-                <a:solidFill>
-                  <a:schemeClr val="tx1"/>
-                </a:solidFill>
-              </a:rPr>
-              <a:t>Product</a:t>
-            </a:r>
-            <a:r>
-              <a:rPr lang="de-DE" sz="1800" dirty="0">
-                <a:solidFill>
-                  <a:schemeClr val="tx1"/>
-                </a:solidFill>
-              </a:rPr>
-              <a:t> Backlog</a:t>
-            </a:r>
           </a:p>
           <a:p>
             <a:endParaRPr lang="de-DE" dirty="0"/>

</xml_diff>